<commit_message>
atualizando lld e hld
</commit_message>
<xml_diff>
--- a/Desenhos/hldelld.pptx
+++ b/Desenhos/hldelld.pptx
@@ -10,7 +10,7 @@
   <p:sldIdLst>
     <p:sldId id="258" r:id="rId2"/>
     <p:sldId id="256" r:id="rId3"/>
-    <p:sldId id="257" r:id="rId4"/>
+    <p:sldId id="259" r:id="rId4"/>
   </p:sldIdLst>
   <p:sldSz cx="12192000" cy="6858000"/>
   <p:notesSz cx="6858000" cy="9144000"/>
@@ -117,6 +117,32 @@
 </p:presentation>
 </file>
 
+<file path=ppt/commentAuthors.xml><?xml version="1.0" encoding="utf-8"?>
+<p:cmAuthorLst xmlns:a="http://schemas.openxmlformats.org/drawingml/2006/main" xmlns:r="http://schemas.openxmlformats.org/officeDocument/2006/relationships" xmlns:p="http://schemas.openxmlformats.org/presentationml/2006/main">
+  <p:cmAuthor id="1" name="marcelo whitehead" initials="mw" lastIdx="1" clrIdx="0">
+    <p:extLst>
+      <p:ext uri="{19B8F6BF-5375-455C-9EA6-DF929625EA0E}">
+        <p15:presenceInfo xmlns:p15="http://schemas.microsoft.com/office/powerpoint/2012/main" userId="104d92a561e1e703" providerId="Windows Live"/>
+      </p:ext>
+    </p:extLst>
+  </p:cmAuthor>
+</p:cmAuthorLst>
+</file>
+
+<file path=ppt/comments/comment1.xml><?xml version="1.0" encoding="utf-8"?>
+<p:cmLst xmlns:a="http://schemas.openxmlformats.org/drawingml/2006/main" xmlns:r="http://schemas.openxmlformats.org/officeDocument/2006/relationships" xmlns:p="http://schemas.openxmlformats.org/presentationml/2006/main">
+  <p:cm authorId="1" dt="2020-04-16T13:34:12.471" idx="1">
+    <p:pos x="10" y="10"/>
+    <p:text/>
+    <p:extLst>
+      <p:ext uri="{C676402C-5697-4E1C-873F-D02D1690AC5C}">
+        <p15:threadingInfo xmlns:p15="http://schemas.microsoft.com/office/powerpoint/2012/main" timeZoneBias="180"/>
+      </p:ext>
+    </p:extLst>
+  </p:cm>
+</p:cmLst>
+</file>
+
 <file path=ppt/notesMasters/notesMaster1.xml><?xml version="1.0" encoding="utf-8"?>
 <p:notesMaster xmlns:a="http://schemas.openxmlformats.org/drawingml/2006/main" xmlns:r="http://schemas.openxmlformats.org/officeDocument/2006/relationships" xmlns:p="http://schemas.openxmlformats.org/presentationml/2006/main">
   <p:cSld>
@@ -199,7 +225,7 @@
           <a:p>
             <a:fld id="{E0C7ADBC-838E-49B9-8356-D3DDFC95DEB9}" type="datetimeFigureOut">
               <a:rPr lang="pt-BR" smtClean="0"/>
-              <a:t>14/04/2020</a:t>
+              <a:t>16/04/2020</a:t>
             </a:fld>
             <a:endParaRPr lang="pt-BR"/>
           </a:p>
@@ -613,7 +639,7 @@
           <a:p>
             <a:fld id="{76312D51-EB56-44ED-81F6-75463F036694}" type="datetimeFigureOut">
               <a:rPr lang="pt-BR" smtClean="0"/>
-              <a:t>14/04/2020</a:t>
+              <a:t>16/04/2020</a:t>
             </a:fld>
             <a:endParaRPr lang="pt-BR"/>
           </a:p>
@@ -811,7 +837,7 @@
           <a:p>
             <a:fld id="{76312D51-EB56-44ED-81F6-75463F036694}" type="datetimeFigureOut">
               <a:rPr lang="pt-BR" smtClean="0"/>
-              <a:t>14/04/2020</a:t>
+              <a:t>16/04/2020</a:t>
             </a:fld>
             <a:endParaRPr lang="pt-BR"/>
           </a:p>
@@ -1019,7 +1045,7 @@
           <a:p>
             <a:fld id="{76312D51-EB56-44ED-81F6-75463F036694}" type="datetimeFigureOut">
               <a:rPr lang="pt-BR" smtClean="0"/>
-              <a:t>14/04/2020</a:t>
+              <a:t>16/04/2020</a:t>
             </a:fld>
             <a:endParaRPr lang="pt-BR"/>
           </a:p>
@@ -1217,7 +1243,7 @@
           <a:p>
             <a:fld id="{76312D51-EB56-44ED-81F6-75463F036694}" type="datetimeFigureOut">
               <a:rPr lang="pt-BR" smtClean="0"/>
-              <a:t>14/04/2020</a:t>
+              <a:t>16/04/2020</a:t>
             </a:fld>
             <a:endParaRPr lang="pt-BR"/>
           </a:p>
@@ -1492,7 +1518,7 @@
           <a:p>
             <a:fld id="{76312D51-EB56-44ED-81F6-75463F036694}" type="datetimeFigureOut">
               <a:rPr lang="pt-BR" smtClean="0"/>
-              <a:t>14/04/2020</a:t>
+              <a:t>16/04/2020</a:t>
             </a:fld>
             <a:endParaRPr lang="pt-BR"/>
           </a:p>
@@ -1757,7 +1783,7 @@
           <a:p>
             <a:fld id="{76312D51-EB56-44ED-81F6-75463F036694}" type="datetimeFigureOut">
               <a:rPr lang="pt-BR" smtClean="0"/>
-              <a:t>14/04/2020</a:t>
+              <a:t>16/04/2020</a:t>
             </a:fld>
             <a:endParaRPr lang="pt-BR"/>
           </a:p>
@@ -2169,7 +2195,7 @@
           <a:p>
             <a:fld id="{76312D51-EB56-44ED-81F6-75463F036694}" type="datetimeFigureOut">
               <a:rPr lang="pt-BR" smtClean="0"/>
-              <a:t>14/04/2020</a:t>
+              <a:t>16/04/2020</a:t>
             </a:fld>
             <a:endParaRPr lang="pt-BR"/>
           </a:p>
@@ -2310,7 +2336,7 @@
           <a:p>
             <a:fld id="{76312D51-EB56-44ED-81F6-75463F036694}" type="datetimeFigureOut">
               <a:rPr lang="pt-BR" smtClean="0"/>
-              <a:t>14/04/2020</a:t>
+              <a:t>16/04/2020</a:t>
             </a:fld>
             <a:endParaRPr lang="pt-BR"/>
           </a:p>
@@ -2423,7 +2449,7 @@
           <a:p>
             <a:fld id="{76312D51-EB56-44ED-81F6-75463F036694}" type="datetimeFigureOut">
               <a:rPr lang="pt-BR" smtClean="0"/>
-              <a:t>14/04/2020</a:t>
+              <a:t>16/04/2020</a:t>
             </a:fld>
             <a:endParaRPr lang="pt-BR"/>
           </a:p>
@@ -2734,7 +2760,7 @@
           <a:p>
             <a:fld id="{76312D51-EB56-44ED-81F6-75463F036694}" type="datetimeFigureOut">
               <a:rPr lang="pt-BR" smtClean="0"/>
-              <a:t>14/04/2020</a:t>
+              <a:t>16/04/2020</a:t>
             </a:fld>
             <a:endParaRPr lang="pt-BR"/>
           </a:p>
@@ -3022,7 +3048,7 @@
           <a:p>
             <a:fld id="{76312D51-EB56-44ED-81F6-75463F036694}" type="datetimeFigureOut">
               <a:rPr lang="pt-BR" smtClean="0"/>
-              <a:t>14/04/2020</a:t>
+              <a:t>16/04/2020</a:t>
             </a:fld>
             <a:endParaRPr lang="pt-BR"/>
           </a:p>
@@ -3263,7 +3289,7 @@
           <a:p>
             <a:fld id="{76312D51-EB56-44ED-81F6-75463F036694}" type="datetimeFigureOut">
               <a:rPr lang="pt-BR" smtClean="0"/>
-              <a:t>14/04/2020</a:t>
+              <a:t>16/04/2020</a:t>
             </a:fld>
             <a:endParaRPr lang="pt-BR"/>
           </a:p>
@@ -3698,8 +3724,8 @@
         </p:nvSpPr>
         <p:spPr>
           <a:xfrm>
-            <a:off x="0" y="3533038"/>
-            <a:ext cx="10515600" cy="4351338"/>
+            <a:off x="0" y="4281756"/>
+            <a:ext cx="10515600" cy="2175669"/>
           </a:xfrm>
         </p:spPr>
         <p:txBody>
@@ -3709,44 +3735,45 @@
           <a:lstStyle/>
           <a:p>
             <a:r>
-              <a:rPr lang="pt-BR" sz="2000" dirty="0"/>
+              <a:rPr lang="pt-BR" sz="1600" dirty="0"/>
               <a:t>01201126 João Vitor Valera Rosa</a:t>
             </a:r>
           </a:p>
           <a:p>
             <a:r>
-              <a:rPr lang="pt-BR" sz="2000" dirty="0"/>
+              <a:rPr lang="pt-BR" sz="1600" dirty="0"/>
               <a:t>01201063 Natã Lino do Nascimento</a:t>
             </a:r>
           </a:p>
           <a:p>
             <a:r>
-              <a:rPr lang="pt-BR" sz="2000" dirty="0"/>
+              <a:rPr lang="pt-BR" sz="1600" dirty="0"/>
               <a:t>01201111 Victor Samir Batista de Barros da Silva</a:t>
             </a:r>
           </a:p>
           <a:p>
             <a:r>
-              <a:rPr lang="pt-BR" sz="2000" dirty="0"/>
+              <a:rPr lang="pt-BR" sz="1600" dirty="0"/>
               <a:t>01201056 Marcelo Whitehead </a:t>
             </a:r>
             <a:r>
-              <a:rPr lang="pt-BR" sz="2000" dirty="0" err="1"/>
+              <a:rPr lang="pt-BR" sz="1600" dirty="0" err="1"/>
               <a:t>Cacace</a:t>
             </a:r>
+            <a:endParaRPr lang="pt-BR" sz="1600" dirty="0"/>
+          </a:p>
+          <a:p>
+            <a:r>
+              <a:rPr lang="pt-BR" sz="1600" dirty="0"/>
+              <a:t>01201026 Felipe Paiva De Araújo</a:t>
+            </a:r>
+          </a:p>
+          <a:p>
+            <a:r>
+              <a:rPr lang="pt-BR" sz="1600" dirty="0"/>
+              <a:t>01201085 Raphael Cassio</a:t>
+            </a:r>
             <a:endParaRPr lang="pt-BR" sz="2000" dirty="0"/>
-          </a:p>
-          <a:p>
-            <a:r>
-              <a:rPr lang="pt-BR" sz="2000" dirty="0"/>
-              <a:t>01201026 Felipe Paiva De Araújo</a:t>
-            </a:r>
-          </a:p>
-          <a:p>
-            <a:r>
-              <a:rPr lang="pt-BR" sz="2000" dirty="0"/>
-              <a:t>01201085 Raphael Cassio</a:t>
-            </a:r>
           </a:p>
         </p:txBody>
       </p:sp>
@@ -4187,7 +4214,7 @@
         <p:spPr>
           <a:xfrm>
             <a:off x="4039330" y="5526227"/>
-            <a:ext cx="949372" cy="507831"/>
+            <a:ext cx="949372" cy="784830"/>
           </a:xfrm>
           <a:prstGeom prst="rect">
             <a:avLst/>
@@ -4202,7 +4229,19 @@
           <a:p>
             <a:r>
               <a:rPr lang="pt-BR" sz="900" dirty="0"/>
-              <a:t>NOTEBOOK COM NODEJS E IDE ARDUINO</a:t>
+              <a:t>NOTEBOOK</a:t>
+            </a:r>
+          </a:p>
+          <a:p>
+            <a:r>
+              <a:rPr lang="pt-BR" sz="900" dirty="0"/>
+              <a:t>CORE I5, 16 GB DE RAM</a:t>
+            </a:r>
+          </a:p>
+          <a:p>
+            <a:r>
+              <a:rPr lang="pt-BR" sz="900" dirty="0"/>
+              <a:t>COM NODEJS E IDE ARDUINO</a:t>
             </a:r>
             <a:endParaRPr lang="pt-BR" sz="1600" dirty="0"/>
           </a:p>
@@ -4351,7 +4390,7 @@
         </p:blipFill>
         <p:spPr>
           <a:xfrm>
-            <a:off x="5223924" y="1846150"/>
+            <a:off x="5223924" y="1915005"/>
             <a:ext cx="979740" cy="979740"/>
           </a:xfrm>
           <a:prstGeom prst="rect">
@@ -4969,8 +5008,8 @@
         </p:nvSpPr>
         <p:spPr>
           <a:xfrm>
-            <a:off x="7544561" y="5483792"/>
-            <a:ext cx="734641" cy="369332"/>
+            <a:off x="7038704" y="5483792"/>
+            <a:ext cx="1240499" cy="369332"/>
           </a:xfrm>
           <a:prstGeom prst="rect">
             <a:avLst/>
@@ -4986,6 +5025,12 @@
             <a:r>
               <a:rPr lang="pt-BR" sz="900" dirty="0"/>
               <a:t>NOTEBOOK/DESKTOP</a:t>
+            </a:r>
+          </a:p>
+          <a:p>
+            <a:r>
+              <a:rPr lang="pt-BR" sz="900" dirty="0"/>
+              <a:t>CORE I5, 8GB DE RAM</a:t>
             </a:r>
             <a:endParaRPr lang="pt-BR" sz="1600" dirty="0"/>
           </a:p>
@@ -5413,7 +5458,7 @@
         </p:nvSpPr>
         <p:spPr>
           <a:xfrm>
-            <a:off x="3233344" y="103901"/>
+            <a:off x="3217786" y="96862"/>
             <a:ext cx="5061417" cy="2030050"/>
           </a:xfrm>
           <a:prstGeom prst="rect">
@@ -5465,7 +5510,7 @@
         </p:nvSpPr>
         <p:spPr>
           <a:xfrm>
-            <a:off x="420564" y="327171"/>
+            <a:off x="81987" y="96473"/>
             <a:ext cx="522900" cy="369332"/>
           </a:xfrm>
           <a:prstGeom prst="rect">
@@ -5480,9 +5525,121 @@
           <a:lstStyle/>
           <a:p>
             <a:r>
+              <a:rPr lang="pt-BR" b="1" dirty="0"/>
+              <a:t>LLD</a:t>
+            </a:r>
+          </a:p>
+        </p:txBody>
+      </p:sp>
+      <p:sp>
+        <p:nvSpPr>
+          <p:cNvPr id="5" name="CaixaDeTexto 4">
+            <a:extLst>
+              <a:ext uri="{FF2B5EF4-FFF2-40B4-BE49-F238E27FC236}">
+                <a16:creationId xmlns:a16="http://schemas.microsoft.com/office/drawing/2014/main" id="{00324186-5835-453F-9CA7-D8BA2FE4FDB1}"/>
+              </a:ext>
+            </a:extLst>
+          </p:cNvPr>
+          <p:cNvSpPr txBox="1"/>
+          <p:nvPr/>
+        </p:nvSpPr>
+        <p:spPr>
+          <a:xfrm>
+            <a:off x="11201687" y="3392545"/>
+            <a:ext cx="1168252" cy="646331"/>
+          </a:xfrm>
+          <a:prstGeom prst="rect">
+            <a:avLst/>
+          </a:prstGeom>
+          <a:noFill/>
+        </p:spPr>
+        <p:txBody>
+          <a:bodyPr wrap="square" rtlCol="0">
+            <a:spAutoFit/>
+          </a:bodyPr>
+          <a:lstStyle/>
+          <a:p>
+            <a:r>
               <a:rPr lang="pt-BR" dirty="0"/>
-              <a:t>LLD</a:t>
-            </a:r>
+              <a:t>CLIENTE</a:t>
+            </a:r>
+            <a:endParaRPr lang="pt-BR" sz="1600" dirty="0"/>
+          </a:p>
+          <a:p>
+            <a:endParaRPr lang="pt-BR" dirty="0"/>
+          </a:p>
+        </p:txBody>
+      </p:sp>
+      <p:sp>
+        <p:nvSpPr>
+          <p:cNvPr id="8" name="CaixaDeTexto 7">
+            <a:extLst>
+              <a:ext uri="{FF2B5EF4-FFF2-40B4-BE49-F238E27FC236}">
+                <a16:creationId xmlns:a16="http://schemas.microsoft.com/office/drawing/2014/main" id="{C6B4F186-1182-4828-8066-2E561878460C}"/>
+              </a:ext>
+            </a:extLst>
+          </p:cNvPr>
+          <p:cNvSpPr txBox="1"/>
+          <p:nvPr/>
+        </p:nvSpPr>
+        <p:spPr>
+          <a:xfrm>
+            <a:off x="-5557" y="3373916"/>
+            <a:ext cx="1242916" cy="369332"/>
+          </a:xfrm>
+          <a:prstGeom prst="rect">
+            <a:avLst/>
+          </a:prstGeom>
+          <a:noFill/>
+        </p:spPr>
+        <p:txBody>
+          <a:bodyPr wrap="square" rtlCol="0">
+            <a:spAutoFit/>
+          </a:bodyPr>
+          <a:lstStyle/>
+          <a:p>
+            <a:r>
+              <a:rPr lang="pt-BR" dirty="0"/>
+              <a:t>HOSPITAL</a:t>
+            </a:r>
+          </a:p>
+        </p:txBody>
+      </p:sp>
+      <p:sp>
+        <p:nvSpPr>
+          <p:cNvPr id="9" name="CaixaDeTexto 8">
+            <a:extLst>
+              <a:ext uri="{FF2B5EF4-FFF2-40B4-BE49-F238E27FC236}">
+                <a16:creationId xmlns:a16="http://schemas.microsoft.com/office/drawing/2014/main" id="{7F4FF870-1C04-4D9F-A43E-EA81B5C6132D}"/>
+              </a:ext>
+            </a:extLst>
+          </p:cNvPr>
+          <p:cNvSpPr txBox="1"/>
+          <p:nvPr/>
+        </p:nvSpPr>
+        <p:spPr>
+          <a:xfrm>
+            <a:off x="2405790" y="1002079"/>
+            <a:ext cx="922047" cy="646331"/>
+          </a:xfrm>
+          <a:prstGeom prst="rect">
+            <a:avLst/>
+          </a:prstGeom>
+          <a:noFill/>
+        </p:spPr>
+        <p:txBody>
+          <a:bodyPr wrap="none" rtlCol="0">
+            <a:spAutoFit/>
+          </a:bodyPr>
+          <a:lstStyle/>
+          <a:p>
+            <a:r>
+              <a:rPr lang="pt-BR" dirty="0"/>
+              <a:t>NUVEM</a:t>
+            </a:r>
+          </a:p>
+          <a:p>
+            <a:endParaRPr lang="pt-BR" dirty="0"/>
           </a:p>
         </p:txBody>
       </p:sp>
@@ -5516,47 +5673,799 @@
           <a:chExt cx="0" cy="0"/>
         </a:xfrm>
       </p:grpSpPr>
-      <p:pic>
-        <p:nvPicPr>
-          <p:cNvPr id="5" name="Espaço Reservado para Conteúdo 4">
-            <a:extLst>
-              <a:ext uri="{FF2B5EF4-FFF2-40B4-BE49-F238E27FC236}">
-                <a16:creationId xmlns:a16="http://schemas.microsoft.com/office/drawing/2014/main" id="{837E1EF9-498C-4770-B71D-46F558A173B5}"/>
-              </a:ext>
-            </a:extLst>
-          </p:cNvPr>
-          <p:cNvPicPr>
-            <a:picLocks noGrp="1" noChangeAspect="1"/>
-          </p:cNvPicPr>
-          <p:nvPr>
-            <p:ph idx="1"/>
-          </p:nvPr>
-        </p:nvPicPr>
-        <p:blipFill>
-          <a:blip r:embed="rId2">
-            <a:extLst>
-              <a:ext uri="{28A0092B-C50C-407E-A947-70E740481C1C}">
-                <a14:useLocalDpi xmlns:a14="http://schemas.microsoft.com/office/drawing/2010/main" val="0"/>
-              </a:ext>
-            </a:extLst>
-          </a:blip>
-          <a:stretch>
-            <a:fillRect/>
-          </a:stretch>
-        </p:blipFill>
-        <p:spPr>
-          <a:xfrm>
-            <a:off x="957645" y="1548788"/>
-            <a:ext cx="9840481" cy="4351338"/>
-          </a:xfrm>
-        </p:spPr>
-      </p:pic>
-      <p:sp>
-        <p:nvSpPr>
-          <p:cNvPr id="6" name="CaixaDeTexto 5">
-            <a:extLst>
-              <a:ext uri="{FF2B5EF4-FFF2-40B4-BE49-F238E27FC236}">
-                <a16:creationId xmlns:a16="http://schemas.microsoft.com/office/drawing/2014/main" id="{15211C2C-355E-4E46-8BB6-AE1B853B473D}"/>
+      <p:grpSp>
+        <p:nvGrpSpPr>
+          <p:cNvPr id="15" name="Agrupar 14">
+            <a:extLst>
+              <a:ext uri="{FF2B5EF4-FFF2-40B4-BE49-F238E27FC236}">
+                <a16:creationId xmlns:a16="http://schemas.microsoft.com/office/drawing/2014/main" id="{2AA94EAC-2E86-4F64-AA8F-724D2E9D51A8}"/>
+              </a:ext>
+            </a:extLst>
+          </p:cNvPr>
+          <p:cNvGrpSpPr/>
+          <p:nvPr/>
+        </p:nvGrpSpPr>
+        <p:grpSpPr>
+          <a:xfrm>
+            <a:off x="97135" y="990757"/>
+            <a:ext cx="11461387" cy="4876485"/>
+            <a:chOff x="-70645" y="864459"/>
+            <a:chExt cx="11461387" cy="4876485"/>
+          </a:xfrm>
+        </p:grpSpPr>
+        <p:grpSp>
+          <p:nvGrpSpPr>
+            <p:cNvPr id="10" name="Agrupar 9">
+              <a:extLst>
+                <a:ext uri="{FF2B5EF4-FFF2-40B4-BE49-F238E27FC236}">
+                  <a16:creationId xmlns:a16="http://schemas.microsoft.com/office/drawing/2014/main" id="{8EECA0B4-2EF0-4301-A9DE-4ED238D835C2}"/>
+                </a:ext>
+              </a:extLst>
+            </p:cNvPr>
+            <p:cNvGrpSpPr/>
+            <p:nvPr/>
+          </p:nvGrpSpPr>
+          <p:grpSpPr>
+            <a:xfrm>
+              <a:off x="0" y="1470389"/>
+              <a:ext cx="2389087" cy="2645966"/>
+              <a:chOff x="0" y="2310143"/>
+              <a:chExt cx="2389087" cy="2645966"/>
+            </a:xfrm>
+          </p:grpSpPr>
+          <p:pic>
+            <p:nvPicPr>
+              <p:cNvPr id="7" name="Imagem 6">
+                <a:extLst>
+                  <a:ext uri="{FF2B5EF4-FFF2-40B4-BE49-F238E27FC236}">
+                    <a16:creationId xmlns:a16="http://schemas.microsoft.com/office/drawing/2014/main" id="{F26C8DA9-9504-4026-8E14-68F6ADDBF07A}"/>
+                  </a:ext>
+                </a:extLst>
+              </p:cNvPr>
+              <p:cNvPicPr>
+                <a:picLocks noChangeAspect="1"/>
+              </p:cNvPicPr>
+              <p:nvPr/>
+            </p:nvPicPr>
+            <p:blipFill>
+              <a:blip r:embed="rId2"/>
+              <a:stretch>
+                <a:fillRect/>
+              </a:stretch>
+            </p:blipFill>
+            <p:spPr>
+              <a:xfrm>
+                <a:off x="275763" y="2506775"/>
+                <a:ext cx="2113324" cy="2449334"/>
+              </a:xfrm>
+              <a:prstGeom prst="rect">
+                <a:avLst/>
+              </a:prstGeom>
+            </p:spPr>
+          </p:pic>
+          <p:pic>
+            <p:nvPicPr>
+              <p:cNvPr id="8" name="Imagem 7">
+                <a:extLst>
+                  <a:ext uri="{FF2B5EF4-FFF2-40B4-BE49-F238E27FC236}">
+                    <a16:creationId xmlns:a16="http://schemas.microsoft.com/office/drawing/2014/main" id="{91B3D6E0-F92E-4E0F-8856-001A3DFCEE14}"/>
+                  </a:ext>
+                </a:extLst>
+              </p:cNvPr>
+              <p:cNvPicPr>
+                <a:picLocks noChangeAspect="1"/>
+              </p:cNvPicPr>
+              <p:nvPr/>
+            </p:nvPicPr>
+            <p:blipFill>
+              <a:blip r:embed="rId3">
+                <a:extLst>
+                  <a:ext uri="{BEBA8EAE-BF5A-486C-A8C5-ECC9F3942E4B}">
+                    <a14:imgProps xmlns:a14="http://schemas.microsoft.com/office/drawing/2010/main">
+                      <a14:imgLayer r:embed="rId4">
+                        <a14:imgEffect>
+                          <a14:backgroundRemoval t="9916" b="92194" l="9781" r="94941">
+                            <a14:foregroundMark x1="30017" y1="86498" x2="30017" y2="86498"/>
+                            <a14:foregroundMark x1="30354" y1="92616" x2="30354" y2="92616"/>
+                            <a14:foregroundMark x1="92917" y1="38186" x2="92917" y2="38186"/>
+                            <a14:foregroundMark x1="94941" y1="38186" x2="94941" y2="38186"/>
+                          </a14:backgroundRemoval>
+                        </a14:imgEffect>
+                      </a14:imgLayer>
+                    </a14:imgProps>
+                  </a:ext>
+                </a:extLst>
+              </a:blip>
+              <a:stretch>
+                <a:fillRect/>
+              </a:stretch>
+            </p:blipFill>
+            <p:spPr>
+              <a:xfrm>
+                <a:off x="513937" y="2310143"/>
+                <a:ext cx="730320" cy="583763"/>
+              </a:xfrm>
+              <a:prstGeom prst="rect">
+                <a:avLst/>
+              </a:prstGeom>
+            </p:spPr>
+          </p:pic>
+          <p:pic>
+            <p:nvPicPr>
+              <p:cNvPr id="9" name="Imagem 8">
+                <a:extLst>
+                  <a:ext uri="{FF2B5EF4-FFF2-40B4-BE49-F238E27FC236}">
+                    <a16:creationId xmlns:a16="http://schemas.microsoft.com/office/drawing/2014/main" id="{3BAF35F8-0CFC-44E3-B902-543638CE991A}"/>
+                  </a:ext>
+                </a:extLst>
+              </p:cNvPr>
+              <p:cNvPicPr>
+                <a:picLocks noChangeAspect="1"/>
+              </p:cNvPicPr>
+              <p:nvPr/>
+            </p:nvPicPr>
+            <p:blipFill>
+              <a:blip r:embed="rId5">
+                <a:extLst>
+                  <a:ext uri="{BEBA8EAE-BF5A-486C-A8C5-ECC9F3942E4B}">
+                    <a14:imgProps xmlns:a14="http://schemas.microsoft.com/office/drawing/2010/main">
+                      <a14:imgLayer r:embed="rId6">
+                        <a14:imgEffect>
+                          <a14:backgroundRemoval t="9956" b="95354" l="8484" r="93141">
+                            <a14:foregroundMark x1="8484" y1="62389" x2="8484" y2="62389"/>
+                            <a14:foregroundMark x1="37004" y1="55088" x2="37004" y2="55088"/>
+                            <a14:foregroundMark x1="39350" y1="36947" x2="39350" y2="36947"/>
+                            <a14:foregroundMark x1="87726" y1="30531" x2="87726" y2="30531"/>
+                            <a14:foregroundMark x1="73466" y1="88938" x2="73466" y2="88938"/>
+                            <a14:foregroundMark x1="25993" y1="90044" x2="25993" y2="90044"/>
+                            <a14:foregroundMark x1="93141" y1="75221" x2="93141" y2="75221"/>
+                            <a14:foregroundMark x1="27617" y1="94248" x2="27617" y2="94248"/>
+                            <a14:foregroundMark x1="77437" y1="95354" x2="77437" y2="95354"/>
+                            <a14:foregroundMark x1="22744" y1="94248" x2="22744" y2="94248"/>
+                          </a14:backgroundRemoval>
+                        </a14:imgEffect>
+                      </a14:imgLayer>
+                    </a14:imgProps>
+                  </a:ext>
+                </a:extLst>
+              </a:blip>
+              <a:stretch>
+                <a:fillRect/>
+              </a:stretch>
+            </p:blipFill>
+            <p:spPr>
+              <a:xfrm>
+                <a:off x="0" y="4394505"/>
+                <a:ext cx="651947" cy="485404"/>
+              </a:xfrm>
+              <a:prstGeom prst="rect">
+                <a:avLst/>
+              </a:prstGeom>
+            </p:spPr>
+          </p:pic>
+        </p:grpSp>
+        <p:sp>
+          <p:nvSpPr>
+            <p:cNvPr id="2" name="CaixaDeTexto 1">
+              <a:extLst>
+                <a:ext uri="{FF2B5EF4-FFF2-40B4-BE49-F238E27FC236}">
+                  <a16:creationId xmlns:a16="http://schemas.microsoft.com/office/drawing/2014/main" id="{4833EE1F-2144-4771-A4EA-EC012B13970F}"/>
+                </a:ext>
+              </a:extLst>
+            </p:cNvPr>
+            <p:cNvSpPr txBox="1"/>
+            <p:nvPr/>
+          </p:nvSpPr>
+          <p:spPr>
+            <a:xfrm flipH="1">
+              <a:off x="-70645" y="3986617"/>
+              <a:ext cx="3120434" cy="738664"/>
+            </a:xfrm>
+            <a:prstGeom prst="rect">
+              <a:avLst/>
+            </a:prstGeom>
+            <a:noFill/>
+          </p:spPr>
+          <p:txBody>
+            <a:bodyPr wrap="square" rtlCol="0">
+              <a:spAutoFit/>
+            </a:bodyPr>
+            <a:lstStyle/>
+            <a:p>
+              <a:pPr algn="ctr"/>
+              <a:r>
+                <a:rPr lang="pt-BR" sz="1400" dirty="0">
+                  <a:latin typeface="Bahnschrift Light" panose="020B0502040204020203" pitchFamily="34" charset="0"/>
+                </a:rPr>
+                <a:t>Dentro do seu hospital nossos sensores ficarão instalados em diferentes locais.</a:t>
+              </a:r>
+            </a:p>
+          </p:txBody>
+        </p:sp>
+        <p:grpSp>
+          <p:nvGrpSpPr>
+            <p:cNvPr id="14" name="Agrupar 13">
+              <a:extLst>
+                <a:ext uri="{FF2B5EF4-FFF2-40B4-BE49-F238E27FC236}">
+                  <a16:creationId xmlns:a16="http://schemas.microsoft.com/office/drawing/2014/main" id="{6A25EEE4-9EDB-47C9-AE1A-211E2D94D87B}"/>
+                </a:ext>
+              </a:extLst>
+            </p:cNvPr>
+            <p:cNvGrpSpPr/>
+            <p:nvPr/>
+          </p:nvGrpSpPr>
+          <p:grpSpPr>
+            <a:xfrm>
+              <a:off x="2252883" y="864459"/>
+              <a:ext cx="9137859" cy="4876485"/>
+              <a:chOff x="2252883" y="864459"/>
+              <a:chExt cx="9137859" cy="4876485"/>
+            </a:xfrm>
+          </p:grpSpPr>
+          <p:sp>
+            <p:nvSpPr>
+              <p:cNvPr id="6" name="AutoShape 6" descr="Free icon &quot;Hospital icon&quot;">
+                <a:extLst>
+                  <a:ext uri="{FF2B5EF4-FFF2-40B4-BE49-F238E27FC236}">
+                    <a16:creationId xmlns:a16="http://schemas.microsoft.com/office/drawing/2014/main" id="{B9648EA8-79D9-4443-AAFC-73A142FF077A}"/>
+                  </a:ext>
+                </a:extLst>
+              </p:cNvPr>
+              <p:cNvSpPr>
+                <a:spLocks noChangeAspect="1" noChangeArrowheads="1"/>
+              </p:cNvSpPr>
+              <p:nvPr/>
+            </p:nvSpPr>
+            <p:spPr bwMode="auto">
+              <a:xfrm>
+                <a:off x="5943600" y="3276600"/>
+                <a:ext cx="1679510" cy="1679510"/>
+              </a:xfrm>
+              <a:prstGeom prst="rect">
+                <a:avLst/>
+              </a:prstGeom>
+              <a:noFill/>
+              <a:extLst>
+                <a:ext uri="{909E8E84-426E-40DD-AFC4-6F175D3DCCD1}">
+                  <a14:hiddenFill xmlns:a14="http://schemas.microsoft.com/office/drawing/2010/main">
+                    <a:solidFill>
+                      <a:srgbClr val="FFFFFF"/>
+                    </a:solidFill>
+                  </a14:hiddenFill>
+                </a:ext>
+              </a:extLst>
+            </p:spPr>
+            <p:txBody>
+              <a:bodyPr vert="horz" wrap="square" lIns="91440" tIns="45720" rIns="91440" bIns="45720" numCol="1" anchor="t" anchorCtr="0" compatLnSpc="1">
+                <a:prstTxWarp prst="textNoShape">
+                  <a:avLst/>
+                </a:prstTxWarp>
+              </a:bodyPr>
+              <a:lstStyle/>
+              <a:p>
+                <a:endParaRPr lang="pt-BR"/>
+              </a:p>
+            </p:txBody>
+          </p:sp>
+          <p:grpSp>
+            <p:nvGrpSpPr>
+              <p:cNvPr id="21" name="Agrupar 20">
+                <a:extLst>
+                  <a:ext uri="{FF2B5EF4-FFF2-40B4-BE49-F238E27FC236}">
+                    <a16:creationId xmlns:a16="http://schemas.microsoft.com/office/drawing/2014/main" id="{51C50A6E-4B8C-49D3-B515-2C9C0FA2E220}"/>
+                  </a:ext>
+                </a:extLst>
+              </p:cNvPr>
+              <p:cNvGrpSpPr/>
+              <p:nvPr/>
+            </p:nvGrpSpPr>
+            <p:grpSpPr>
+              <a:xfrm>
+                <a:off x="6450183" y="1035976"/>
+                <a:ext cx="1375925" cy="1262089"/>
+                <a:chOff x="6247185" y="573214"/>
+                <a:chExt cx="1375925" cy="1262089"/>
+              </a:xfrm>
+            </p:grpSpPr>
+            <p:pic>
+              <p:nvPicPr>
+                <p:cNvPr id="11" name="Imagem 10">
+                  <a:extLst>
+                    <a:ext uri="{FF2B5EF4-FFF2-40B4-BE49-F238E27FC236}">
+                      <a16:creationId xmlns:a16="http://schemas.microsoft.com/office/drawing/2014/main" id="{5BF03B41-94F2-4F4F-ACD8-58DCFC820555}"/>
+                    </a:ext>
+                  </a:extLst>
+                </p:cNvPr>
+                <p:cNvPicPr>
+                  <a:picLocks noChangeAspect="1"/>
+                </p:cNvPicPr>
+                <p:nvPr/>
+              </p:nvPicPr>
+              <p:blipFill>
+                <a:blip r:embed="rId7">
+                  <a:extLst>
+                    <a:ext uri="{BEBA8EAE-BF5A-486C-A8C5-ECC9F3942E4B}">
+                      <a14:imgProps xmlns:a14="http://schemas.microsoft.com/office/drawing/2010/main">
+                        <a14:imgLayer r:embed="rId8">
+                          <a14:imgEffect>
+                            <a14:backgroundRemoval t="5098" b="94902" l="5755" r="94245">
+                              <a14:foregroundMark x1="17446" y1="66275" x2="25360" y2="66275"/>
+                              <a14:foregroundMark x1="51079" y1="73333" x2="51079" y2="73333"/>
+                              <a14:foregroundMark x1="8094" y1="40588" x2="7194" y2="62745"/>
+                              <a14:foregroundMark x1="94424" y1="27059" x2="94604" y2="56471"/>
+                              <a14:foregroundMark x1="73921" y1="82549" x2="19784" y2="81373"/>
+                              <a14:foregroundMark x1="58633" y1="85882" x2="64568" y2="94118"/>
+                              <a14:foregroundMark x1="51344" y1="91388" x2="54496" y2="93529"/>
+                              <a14:foregroundMark x1="42086" y1="85098" x2="44966" y2="87055"/>
+                              <a14:foregroundMark x1="40468" y1="90000" x2="35072" y2="95098"/>
+                              <a14:foregroundMark x1="75899" y1="82353" x2="92086" y2="81373"/>
+                              <a14:foregroundMark x1="93705" y1="60196" x2="93532" y2="82447"/>
+                              <a14:foregroundMark x1="94065" y1="13333" x2="94065" y2="25294"/>
+                              <a14:foregroundMark x1="6295" y1="11765" x2="6115" y2="80392"/>
+                              <a14:foregroundMark x1="7554" y1="6471" x2="39209" y2="5490"/>
+                              <a14:foregroundMark x1="39209" y1="5490" x2="49820" y2="5490"/>
+                              <a14:foregroundMark x1="54317" y1="5098" x2="71403" y2="5882"/>
+                              <a14:foregroundMark x1="71403" y1="5882" x2="87770" y2="5098"/>
+                              <a14:foregroundMark x1="87770" y1="5098" x2="89928" y2="6078"/>
+                              <a14:foregroundMark x1="34712" y1="66667" x2="51799" y2="65098"/>
+                              <a14:foregroundMark x1="51799" y1="65098" x2="71583" y2="65294"/>
+                              <a14:foregroundMark x1="77152" y1="67357" x2="89029" y2="66078"/>
+                              <a14:foregroundMark x1="89029" y1="66078" x2="89388" y2="66078"/>
+                              <a14:foregroundMark x1="18885" y1="83333" x2="8633" y2="82353"/>
+                              <a14:backgroundMark x1="20144" y1="36078" x2="48741" y2="43725"/>
+                              <a14:backgroundMark x1="37050" y1="38235" x2="69964" y2="53922"/>
+                              <a14:backgroundMark x1="69964" y1="53922" x2="72122" y2="54314"/>
+                              <a14:backgroundMark x1="27698" y1="33137" x2="61511" y2="61569"/>
+                              <a14:backgroundMark x1="76259" y1="95294" x2="91547" y2="95098"/>
+                              <a14:backgroundMark x1="91547" y1="95098" x2="93705" y2="95098"/>
+                              <a14:backgroundMark x1="7554" y1="88627" x2="8633" y2="90588"/>
+                              <a14:backgroundMark x1="8633" y1="90588" x2="8633" y2="90588"/>
+                              <a14:backgroundMark x1="8633" y1="90588" x2="8633" y2="90588"/>
+                              <a14:backgroundMark x1="2518" y1="11176" x2="1619" y2="78431"/>
+                              <a14:backgroundMark x1="1619" y1="78431" x2="6835" y2="94118"/>
+                              <a14:backgroundMark x1="6835" y1="94118" x2="8094" y2="94706"/>
+                              <a14:backgroundMark x1="44964" y1="90196" x2="48741" y2="88431"/>
+                              <a14:backgroundMark x1="47302" y1="90980" x2="51978" y2="90196"/>
+                              <a14:backgroundMark x1="45504" y1="88431" x2="47482" y2="87647"/>
+                              <a14:backgroundMark x1="44424" y1="88431" x2="44424" y2="88431"/>
+                              <a14:backgroundMark x1="45144" y1="87647" x2="45144" y2="87647"/>
+                              <a14:backgroundMark x1="44964" y1="87059" x2="47482" y2="87647"/>
+                              <a14:backgroundMark x1="77338" y1="67647" x2="73561" y2="68235"/>
+                              <a14:backgroundMark x1="92806" y1="83922" x2="94604" y2="83333"/>
+                            </a14:backgroundRemoval>
+                          </a14:imgEffect>
+                        </a14:imgLayer>
+                      </a14:imgProps>
+                    </a:ext>
+                  </a:extLst>
+                </a:blip>
+                <a:stretch>
+                  <a:fillRect/>
+                </a:stretch>
+              </p:blipFill>
+              <p:spPr>
+                <a:xfrm>
+                  <a:off x="6247185" y="573214"/>
+                  <a:ext cx="1375925" cy="1262089"/>
+                </a:xfrm>
+                <a:prstGeom prst="rect">
+                  <a:avLst/>
+                </a:prstGeom>
+              </p:spPr>
+            </p:pic>
+            <p:pic>
+              <p:nvPicPr>
+                <p:cNvPr id="12" name="Imagem 11">
+                  <a:extLst>
+                    <a:ext uri="{FF2B5EF4-FFF2-40B4-BE49-F238E27FC236}">
+                      <a16:creationId xmlns:a16="http://schemas.microsoft.com/office/drawing/2014/main" id="{9C629048-9853-4613-82BB-750B48785D59}"/>
+                    </a:ext>
+                  </a:extLst>
+                </p:cNvPr>
+                <p:cNvPicPr>
+                  <a:picLocks noChangeAspect="1"/>
+                </p:cNvPicPr>
+                <p:nvPr/>
+              </p:nvPicPr>
+              <p:blipFill>
+                <a:blip r:embed="rId9">
+                  <a:extLst>
+                    <a:ext uri="{BEBA8EAE-BF5A-486C-A8C5-ECC9F3942E4B}">
+                      <a14:imgProps xmlns:a14="http://schemas.microsoft.com/office/drawing/2010/main">
+                        <a14:imgLayer r:embed="rId10">
+                          <a14:imgEffect>
+                            <a14:backgroundRemoval t="7733" b="92619" l="9695" r="89767">
+                              <a14:foregroundMark x1="59246" y1="69420" x2="59246" y2="69420"/>
+                              <a14:foregroundMark x1="36625" y1="62742" x2="36625" y2="62742"/>
+                              <a14:foregroundMark x1="20108" y1="78207" x2="20108" y2="78207"/>
+                              <a14:foregroundMark x1="15260" y1="38489" x2="15260" y2="38489"/>
+                              <a14:foregroundMark x1="37882" y1="19684" x2="37882" y2="19684"/>
+                              <a14:foregroundMark x1="80251" y1="7733" x2="80251" y2="7733"/>
+                              <a14:foregroundMark x1="84740" y1="92619" x2="84740" y2="92619"/>
+                            </a14:backgroundRemoval>
+                          </a14:imgEffect>
+                        </a14:imgLayer>
+                      </a14:imgProps>
+                    </a:ext>
+                  </a:extLst>
+                </a:blip>
+                <a:stretch>
+                  <a:fillRect/>
+                </a:stretch>
+              </p:blipFill>
+              <p:spPr>
+                <a:xfrm>
+                  <a:off x="6850030" y="682000"/>
+                  <a:ext cx="703295" cy="718447"/>
+                </a:xfrm>
+                <a:prstGeom prst="rect">
+                  <a:avLst/>
+                </a:prstGeom>
+              </p:spPr>
+            </p:pic>
+          </p:grpSp>
+          <p:pic>
+            <p:nvPicPr>
+              <p:cNvPr id="1032" name="Picture 8" descr="Sensor de Umidade e Temperatura DHT11 – Loja Arduino Belém">
+                <a:extLst>
+                  <a:ext uri="{FF2B5EF4-FFF2-40B4-BE49-F238E27FC236}">
+                    <a16:creationId xmlns:a16="http://schemas.microsoft.com/office/drawing/2014/main" id="{798FA47B-DE6E-4D32-8122-AAA4D8E9B910}"/>
+                  </a:ext>
+                </a:extLst>
+              </p:cNvPr>
+              <p:cNvPicPr>
+                <a:picLocks noChangeAspect="1" noChangeArrowheads="1"/>
+              </p:cNvPicPr>
+              <p:nvPr/>
+            </p:nvPicPr>
+            <p:blipFill>
+              <a:blip r:embed="rId11">
+                <a:extLst>
+                  <a:ext uri="{28A0092B-C50C-407E-A947-70E740481C1C}">
+                    <a14:useLocalDpi xmlns:a14="http://schemas.microsoft.com/office/drawing/2010/main" val="0"/>
+                  </a:ext>
+                </a:extLst>
+              </a:blip>
+              <a:srcRect/>
+              <a:stretch>
+                <a:fillRect/>
+              </a:stretch>
+            </p:blipFill>
+            <p:spPr bwMode="auto">
+              <a:xfrm flipH="1">
+                <a:off x="3812895" y="2412846"/>
+                <a:ext cx="1247313" cy="1247313"/>
+              </a:xfrm>
+              <a:prstGeom prst="rect">
+                <a:avLst/>
+              </a:prstGeom>
+              <a:noFill/>
+              <a:extLst>
+                <a:ext uri="{909E8E84-426E-40DD-AFC4-6F175D3DCCD1}">
+                  <a14:hiddenFill xmlns:a14="http://schemas.microsoft.com/office/drawing/2010/main">
+                    <a:solidFill>
+                      <a:srgbClr val="FFFFFF"/>
+                    </a:solidFill>
+                  </a14:hiddenFill>
+                </a:ext>
+              </a:extLst>
+            </p:spPr>
+          </p:pic>
+          <p:pic>
+            <p:nvPicPr>
+              <p:cNvPr id="22" name="Imagem 21">
+                <a:extLst>
+                  <a:ext uri="{FF2B5EF4-FFF2-40B4-BE49-F238E27FC236}">
+                    <a16:creationId xmlns:a16="http://schemas.microsoft.com/office/drawing/2014/main" id="{A021D126-77B8-4402-8710-A1F83974E2AC}"/>
+                  </a:ext>
+                </a:extLst>
+              </p:cNvPr>
+              <p:cNvPicPr>
+                <a:picLocks noChangeAspect="1"/>
+              </p:cNvPicPr>
+              <p:nvPr/>
+            </p:nvPicPr>
+            <p:blipFill>
+              <a:blip r:embed="rId12">
+                <a:extLst>
+                  <a:ext uri="{BEBA8EAE-BF5A-486C-A8C5-ECC9F3942E4B}">
+                    <a14:imgProps xmlns:a14="http://schemas.microsoft.com/office/drawing/2010/main">
+                      <a14:imgLayer r:embed="rId13">
+                        <a14:imgEffect>
+                          <a14:backgroundRemoval t="10000" b="90000" l="10000" r="90000">
+                            <a14:foregroundMark x1="78075" y1="54000" x2="78075" y2="54000"/>
+                            <a14:foregroundMark x1="78075" y1="69000" x2="78075" y2="69000"/>
+                          </a14:backgroundRemoval>
+                        </a14:imgEffect>
+                      </a14:imgLayer>
+                    </a14:imgProps>
+                  </a:ext>
+                </a:extLst>
+              </a:blip>
+              <a:stretch>
+                <a:fillRect/>
+              </a:stretch>
+            </p:blipFill>
+            <p:spPr>
+              <a:xfrm>
+                <a:off x="2252883" y="2501040"/>
+                <a:ext cx="1567709" cy="838347"/>
+              </a:xfrm>
+              <a:prstGeom prst="rect">
+                <a:avLst/>
+              </a:prstGeom>
+            </p:spPr>
+          </p:pic>
+          <p:pic>
+            <p:nvPicPr>
+              <p:cNvPr id="23" name="Imagem 22">
+                <a:extLst>
+                  <a:ext uri="{FF2B5EF4-FFF2-40B4-BE49-F238E27FC236}">
+                    <a16:creationId xmlns:a16="http://schemas.microsoft.com/office/drawing/2014/main" id="{296520C2-F6D9-49AF-B38B-1AFCA21F453E}"/>
+                  </a:ext>
+                </a:extLst>
+              </p:cNvPr>
+              <p:cNvPicPr>
+                <a:picLocks noChangeAspect="1"/>
+              </p:cNvPicPr>
+              <p:nvPr/>
+            </p:nvPicPr>
+            <p:blipFill>
+              <a:blip r:embed="rId14">
+                <a:extLst>
+                  <a:ext uri="{BEBA8EAE-BF5A-486C-A8C5-ECC9F3942E4B}">
+                    <a14:imgProps xmlns:a14="http://schemas.microsoft.com/office/drawing/2010/main">
+                      <a14:imgLayer r:embed="rId15">
+                        <a14:imgEffect>
+                          <a14:backgroundRemoval t="9868" b="89474" l="9581" r="91018">
+                            <a14:foregroundMark x1="78443" y1="53947" x2="78443" y2="53947"/>
+                            <a14:foregroundMark x1="91018" y1="67105" x2="91018" y2="67105"/>
+                          </a14:backgroundRemoval>
+                        </a14:imgEffect>
+                      </a14:imgLayer>
+                    </a14:imgProps>
+                  </a:ext>
+                </a:extLst>
+              </a:blip>
+              <a:stretch>
+                <a:fillRect/>
+              </a:stretch>
+            </p:blipFill>
+            <p:spPr>
+              <a:xfrm rot="611159">
+                <a:off x="7147807" y="2541794"/>
+                <a:ext cx="1487060" cy="1353492"/>
+              </a:xfrm>
+              <a:prstGeom prst="rect">
+                <a:avLst/>
+              </a:prstGeom>
+            </p:spPr>
+          </p:pic>
+          <p:pic>
+            <p:nvPicPr>
+              <p:cNvPr id="25" name="Imagem 24">
+                <a:extLst>
+                  <a:ext uri="{FF2B5EF4-FFF2-40B4-BE49-F238E27FC236}">
+                    <a16:creationId xmlns:a16="http://schemas.microsoft.com/office/drawing/2014/main" id="{DD9B9BED-DC98-4C86-BA70-4F6B83A37BB7}"/>
+                  </a:ext>
+                </a:extLst>
+              </p:cNvPr>
+              <p:cNvPicPr>
+                <a:picLocks noChangeAspect="1"/>
+              </p:cNvPicPr>
+              <p:nvPr/>
+            </p:nvPicPr>
+            <p:blipFill>
+              <a:blip r:embed="rId16">
+                <a:extLst>
+                  <a:ext uri="{BEBA8EAE-BF5A-486C-A8C5-ECC9F3942E4B}">
+                    <a14:imgProps xmlns:a14="http://schemas.microsoft.com/office/drawing/2010/main">
+                      <a14:imgLayer r:embed="rId17">
+                        <a14:imgEffect>
+                          <a14:backgroundRemoval t="10000" b="90000" l="10000" r="90000">
+                            <a14:foregroundMark x1="46392" y1="79348" x2="46392" y2="79348"/>
+                          </a14:backgroundRemoval>
+                        </a14:imgEffect>
+                      </a14:imgLayer>
+                    </a14:imgProps>
+                  </a:ext>
+                </a:extLst>
+              </a:blip>
+              <a:stretch>
+                <a:fillRect/>
+              </a:stretch>
+            </p:blipFill>
+            <p:spPr>
+              <a:xfrm rot="10332103">
+                <a:off x="5026147" y="1648544"/>
+                <a:ext cx="1437286" cy="1363199"/>
+              </a:xfrm>
+              <a:prstGeom prst="rect">
+                <a:avLst/>
+              </a:prstGeom>
+            </p:spPr>
+          </p:pic>
+          <p:sp>
+            <p:nvSpPr>
+              <p:cNvPr id="3" name="CaixaDeTexto 2">
+                <a:extLst>
+                  <a:ext uri="{FF2B5EF4-FFF2-40B4-BE49-F238E27FC236}">
+                    <a16:creationId xmlns:a16="http://schemas.microsoft.com/office/drawing/2014/main" id="{1FFF7644-306F-434E-9051-A76FA0FBA59E}"/>
+                  </a:ext>
+                </a:extLst>
+              </p:cNvPr>
+              <p:cNvSpPr txBox="1"/>
+              <p:nvPr/>
+            </p:nvSpPr>
+            <p:spPr>
+              <a:xfrm>
+                <a:off x="3438377" y="3518613"/>
+                <a:ext cx="2272644" cy="1231106"/>
+              </a:xfrm>
+              <a:prstGeom prst="rect">
+                <a:avLst/>
+              </a:prstGeom>
+              <a:noFill/>
+            </p:spPr>
+            <p:txBody>
+              <a:bodyPr wrap="square" rtlCol="0">
+                <a:spAutoFit/>
+              </a:bodyPr>
+              <a:lstStyle/>
+              <a:p>
+                <a:pPr algn="ctr"/>
+                <a:r>
+                  <a:rPr lang="pt-BR" sz="1400" dirty="0">
+                    <a:latin typeface="Bahnschrift Light" panose="020B0502040204020203" pitchFamily="34" charset="0"/>
+                  </a:rPr>
+                  <a:t>Nossos sensores captarão dados sobre temperatura e umidade dentro de cada local.</a:t>
+                </a:r>
+              </a:p>
+              <a:p>
+                <a:endParaRPr lang="pt-BR" dirty="0"/>
+              </a:p>
+            </p:txBody>
+          </p:sp>
+          <p:sp>
+            <p:nvSpPr>
+              <p:cNvPr id="4" name="CaixaDeTexto 3">
+                <a:extLst>
+                  <a:ext uri="{FF2B5EF4-FFF2-40B4-BE49-F238E27FC236}">
+                    <a16:creationId xmlns:a16="http://schemas.microsoft.com/office/drawing/2014/main" id="{3336406C-C630-43D0-8724-EDC1014976CF}"/>
+                  </a:ext>
+                </a:extLst>
+              </p:cNvPr>
+              <p:cNvSpPr txBox="1"/>
+              <p:nvPr/>
+            </p:nvSpPr>
+            <p:spPr>
+              <a:xfrm>
+                <a:off x="7826108" y="864459"/>
+                <a:ext cx="2391930" cy="1384995"/>
+              </a:xfrm>
+              <a:prstGeom prst="rect">
+                <a:avLst/>
+              </a:prstGeom>
+              <a:noFill/>
+            </p:spPr>
+            <p:txBody>
+              <a:bodyPr wrap="square" rtlCol="0">
+                <a:spAutoFit/>
+              </a:bodyPr>
+              <a:lstStyle/>
+              <a:p>
+                <a:pPr algn="ctr"/>
+                <a:r>
+                  <a:rPr lang="pt-BR" sz="1400" dirty="0">
+                    <a:latin typeface="Bahnschrift Light" panose="020B0502040204020203" pitchFamily="34" charset="0"/>
+                  </a:rPr>
+                  <a:t>Através de nosso site você terá informações em tempo real através de gráficos, podendo verificar registros e sendo alertado sobre irregularidades.</a:t>
+                </a:r>
+              </a:p>
+            </p:txBody>
+          </p:sp>
+          <p:pic>
+            <p:nvPicPr>
+              <p:cNvPr id="2050" name="Picture 2" descr="Healthy Heart Icon at GetDrawings | Free download">
+                <a:extLst>
+                  <a:ext uri="{FF2B5EF4-FFF2-40B4-BE49-F238E27FC236}">
+                    <a16:creationId xmlns:a16="http://schemas.microsoft.com/office/drawing/2014/main" id="{5B086D7C-655F-450B-9CAC-E50627B1D4CC}"/>
+                  </a:ext>
+                </a:extLst>
+              </p:cNvPr>
+              <p:cNvPicPr>
+                <a:picLocks noChangeAspect="1" noChangeArrowheads="1"/>
+              </p:cNvPicPr>
+              <p:nvPr/>
+            </p:nvPicPr>
+            <p:blipFill>
+              <a:blip r:embed="rId18">
+                <a:extLst>
+                  <a:ext uri="{28A0092B-C50C-407E-A947-70E740481C1C}">
+                    <a14:useLocalDpi xmlns:a14="http://schemas.microsoft.com/office/drawing/2010/main" val="0"/>
+                  </a:ext>
+                </a:extLst>
+              </a:blip>
+              <a:srcRect/>
+              <a:stretch>
+                <a:fillRect/>
+              </a:stretch>
+            </p:blipFill>
+            <p:spPr bwMode="auto">
+              <a:xfrm>
+                <a:off x="8663954" y="3149832"/>
+                <a:ext cx="1175120" cy="1175120"/>
+              </a:xfrm>
+              <a:prstGeom prst="rect">
+                <a:avLst/>
+              </a:prstGeom>
+              <a:noFill/>
+              <a:extLst>
+                <a:ext uri="{909E8E84-426E-40DD-AFC4-6F175D3DCCD1}">
+                  <a14:hiddenFill xmlns:a14="http://schemas.microsoft.com/office/drawing/2010/main">
+                    <a:solidFill>
+                      <a:srgbClr val="FFFFFF"/>
+                    </a:solidFill>
+                  </a14:hiddenFill>
+                </a:ext>
+              </a:extLst>
+            </p:spPr>
+          </p:pic>
+          <p:sp>
+            <p:nvSpPr>
+              <p:cNvPr id="5" name="CaixaDeTexto 4">
+                <a:extLst>
+                  <a:ext uri="{FF2B5EF4-FFF2-40B4-BE49-F238E27FC236}">
+                    <a16:creationId xmlns:a16="http://schemas.microsoft.com/office/drawing/2014/main" id="{68E85549-84BC-4AFF-A306-80FDFB1F0DA0}"/>
+                  </a:ext>
+                </a:extLst>
+              </p:cNvPr>
+              <p:cNvSpPr txBox="1"/>
+              <p:nvPr/>
+            </p:nvSpPr>
+            <p:spPr>
+              <a:xfrm>
+                <a:off x="7212328" y="4355949"/>
+                <a:ext cx="4178414" cy="1384995"/>
+              </a:xfrm>
+              <a:prstGeom prst="rect">
+                <a:avLst/>
+              </a:prstGeom>
+              <a:noFill/>
+            </p:spPr>
+            <p:txBody>
+              <a:bodyPr wrap="square" rtlCol="0">
+                <a:spAutoFit/>
+              </a:bodyPr>
+              <a:lstStyle/>
+              <a:p>
+                <a:pPr algn="ctr"/>
+                <a:r>
+                  <a:rPr lang="pt-BR" sz="1400" dirty="0">
+                    <a:latin typeface="Bahnschrift Light" panose="020B0502040204020203" pitchFamily="34" charset="0"/>
+                  </a:rPr>
+                  <a:t>Com nosso sistema você terá o controle da temperatura e umidade totalmente automatizado e em tempo real. </a:t>
+                </a:r>
+              </a:p>
+              <a:p>
+                <a:pPr algn="ctr"/>
+                <a:r>
+                  <a:rPr lang="pt-BR" sz="1400" dirty="0">
+                    <a:latin typeface="Bahnschrift Light" panose="020B0502040204020203" pitchFamily="34" charset="0"/>
+                  </a:rPr>
+                  <a:t> Diminuindo a perda de remédios, equipamentos hospitalares, alterações de exames e os casos de infecção hospitalar.</a:t>
+                </a:r>
+              </a:p>
+            </p:txBody>
+          </p:sp>
+        </p:grpSp>
+      </p:grpSp>
+      <p:sp>
+        <p:nvSpPr>
+          <p:cNvPr id="13" name="CaixaDeTexto 12">
+            <a:extLst>
+              <a:ext uri="{FF2B5EF4-FFF2-40B4-BE49-F238E27FC236}">
+                <a16:creationId xmlns:a16="http://schemas.microsoft.com/office/drawing/2014/main" id="{BAAD4BD6-A00C-416C-9B9F-3B3D63B6F91F}"/>
               </a:ext>
             </a:extLst>
           </p:cNvPr>
@@ -5565,8 +6474,8 @@
         </p:nvSpPr>
         <p:spPr>
           <a:xfrm>
-            <a:off x="604007" y="311543"/>
-            <a:ext cx="569387" cy="646331"/>
+            <a:off x="275763" y="176169"/>
+            <a:ext cx="569387" cy="369332"/>
           </a:xfrm>
           <a:prstGeom prst="rect">
             <a:avLst/>
@@ -5580,19 +6489,16 @@
           <a:lstStyle/>
           <a:p>
             <a:r>
-              <a:rPr lang="pt-BR" dirty="0"/>
+              <a:rPr lang="pt-BR" b="1" dirty="0"/>
               <a:t>HLD</a:t>
             </a:r>
-          </a:p>
-          <a:p>
-            <a:endParaRPr lang="pt-BR" dirty="0"/>
           </a:p>
         </p:txBody>
       </p:sp>
     </p:spTree>
     <p:extLst>
       <p:ext uri="{BB962C8B-B14F-4D97-AF65-F5344CB8AC3E}">
-        <p14:creationId xmlns:p14="http://schemas.microsoft.com/office/powerpoint/2010/main" val="1708163753"/>
+        <p14:creationId xmlns:p14="http://schemas.microsoft.com/office/powerpoint/2010/main" val="548009701"/>
       </p:ext>
     </p:extLst>
   </p:cSld>

</xml_diff>

<commit_message>
diagrama de arq local
</commit_message>
<xml_diff>
--- a/Desenhos/hldelld.pptx
+++ b/Desenhos/hldelld.pptx
@@ -5,12 +5,13 @@
     <p:sldMasterId id="2147483648" r:id="rId1"/>
   </p:sldMasterIdLst>
   <p:notesMasterIdLst>
-    <p:notesMasterId r:id="rId5"/>
+    <p:notesMasterId r:id="rId6"/>
   </p:notesMasterIdLst>
   <p:sldIdLst>
     <p:sldId id="258" r:id="rId2"/>
     <p:sldId id="256" r:id="rId3"/>
     <p:sldId id="259" r:id="rId4"/>
+    <p:sldId id="260" r:id="rId5"/>
   </p:sldIdLst>
   <p:sldSz cx="12192000" cy="6858000"/>
   <p:notesSz cx="6858000" cy="9144000"/>
@@ -225,7 +226,7 @@
           <a:p>
             <a:fld id="{E0C7ADBC-838E-49B9-8356-D3DDFC95DEB9}" type="datetimeFigureOut">
               <a:rPr lang="pt-BR" smtClean="0"/>
-              <a:t>16/04/2020</a:t>
+              <a:t>05/05/2020</a:t>
             </a:fld>
             <a:endParaRPr lang="pt-BR"/>
           </a:p>
@@ -639,7 +640,7 @@
           <a:p>
             <a:fld id="{76312D51-EB56-44ED-81F6-75463F036694}" type="datetimeFigureOut">
               <a:rPr lang="pt-BR" smtClean="0"/>
-              <a:t>16/04/2020</a:t>
+              <a:t>05/05/2020</a:t>
             </a:fld>
             <a:endParaRPr lang="pt-BR"/>
           </a:p>
@@ -837,7 +838,7 @@
           <a:p>
             <a:fld id="{76312D51-EB56-44ED-81F6-75463F036694}" type="datetimeFigureOut">
               <a:rPr lang="pt-BR" smtClean="0"/>
-              <a:t>16/04/2020</a:t>
+              <a:t>05/05/2020</a:t>
             </a:fld>
             <a:endParaRPr lang="pt-BR"/>
           </a:p>
@@ -1045,7 +1046,7 @@
           <a:p>
             <a:fld id="{76312D51-EB56-44ED-81F6-75463F036694}" type="datetimeFigureOut">
               <a:rPr lang="pt-BR" smtClean="0"/>
-              <a:t>16/04/2020</a:t>
+              <a:t>05/05/2020</a:t>
             </a:fld>
             <a:endParaRPr lang="pt-BR"/>
           </a:p>
@@ -1243,7 +1244,7 @@
           <a:p>
             <a:fld id="{76312D51-EB56-44ED-81F6-75463F036694}" type="datetimeFigureOut">
               <a:rPr lang="pt-BR" smtClean="0"/>
-              <a:t>16/04/2020</a:t>
+              <a:t>05/05/2020</a:t>
             </a:fld>
             <a:endParaRPr lang="pt-BR"/>
           </a:p>
@@ -1518,7 +1519,7 @@
           <a:p>
             <a:fld id="{76312D51-EB56-44ED-81F6-75463F036694}" type="datetimeFigureOut">
               <a:rPr lang="pt-BR" smtClean="0"/>
-              <a:t>16/04/2020</a:t>
+              <a:t>05/05/2020</a:t>
             </a:fld>
             <a:endParaRPr lang="pt-BR"/>
           </a:p>
@@ -1783,7 +1784,7 @@
           <a:p>
             <a:fld id="{76312D51-EB56-44ED-81F6-75463F036694}" type="datetimeFigureOut">
               <a:rPr lang="pt-BR" smtClean="0"/>
-              <a:t>16/04/2020</a:t>
+              <a:t>05/05/2020</a:t>
             </a:fld>
             <a:endParaRPr lang="pt-BR"/>
           </a:p>
@@ -2195,7 +2196,7 @@
           <a:p>
             <a:fld id="{76312D51-EB56-44ED-81F6-75463F036694}" type="datetimeFigureOut">
               <a:rPr lang="pt-BR" smtClean="0"/>
-              <a:t>16/04/2020</a:t>
+              <a:t>05/05/2020</a:t>
             </a:fld>
             <a:endParaRPr lang="pt-BR"/>
           </a:p>
@@ -2336,7 +2337,7 @@
           <a:p>
             <a:fld id="{76312D51-EB56-44ED-81F6-75463F036694}" type="datetimeFigureOut">
               <a:rPr lang="pt-BR" smtClean="0"/>
-              <a:t>16/04/2020</a:t>
+              <a:t>05/05/2020</a:t>
             </a:fld>
             <a:endParaRPr lang="pt-BR"/>
           </a:p>
@@ -2449,7 +2450,7 @@
           <a:p>
             <a:fld id="{76312D51-EB56-44ED-81F6-75463F036694}" type="datetimeFigureOut">
               <a:rPr lang="pt-BR" smtClean="0"/>
-              <a:t>16/04/2020</a:t>
+              <a:t>05/05/2020</a:t>
             </a:fld>
             <a:endParaRPr lang="pt-BR"/>
           </a:p>
@@ -2760,7 +2761,7 @@
           <a:p>
             <a:fld id="{76312D51-EB56-44ED-81F6-75463F036694}" type="datetimeFigureOut">
               <a:rPr lang="pt-BR" smtClean="0"/>
-              <a:t>16/04/2020</a:t>
+              <a:t>05/05/2020</a:t>
             </a:fld>
             <a:endParaRPr lang="pt-BR"/>
           </a:p>
@@ -3048,7 +3049,7 @@
           <a:p>
             <a:fld id="{76312D51-EB56-44ED-81F6-75463F036694}" type="datetimeFigureOut">
               <a:rPr lang="pt-BR" smtClean="0"/>
-              <a:t>16/04/2020</a:t>
+              <a:t>05/05/2020</a:t>
             </a:fld>
             <a:endParaRPr lang="pt-BR"/>
           </a:p>
@@ -3289,7 +3290,7 @@
           <a:p>
             <a:fld id="{76312D51-EB56-44ED-81F6-75463F036694}" type="datetimeFigureOut">
               <a:rPr lang="pt-BR" smtClean="0"/>
-              <a:t>16/04/2020</a:t>
+              <a:t>05/05/2020</a:t>
             </a:fld>
             <a:endParaRPr lang="pt-BR"/>
           </a:p>
@@ -6508,6 +6509,1459 @@
 </p:sld>
 </file>
 
+<file path=ppt/slides/slide4.xml><?xml version="1.0" encoding="utf-8"?>
+<p:sld xmlns:a="http://schemas.openxmlformats.org/drawingml/2006/main" xmlns:r="http://schemas.openxmlformats.org/officeDocument/2006/relationships" xmlns:p="http://schemas.openxmlformats.org/presentationml/2006/main">
+  <p:cSld>
+    <p:spTree>
+      <p:nvGrpSpPr>
+        <p:cNvPr id="1" name=""/>
+        <p:cNvGrpSpPr/>
+        <p:nvPr/>
+      </p:nvGrpSpPr>
+      <p:grpSpPr>
+        <a:xfrm>
+          <a:off x="0" y="0"/>
+          <a:ext cx="0" cy="0"/>
+          <a:chOff x="0" y="0"/>
+          <a:chExt cx="0" cy="0"/>
+        </a:xfrm>
+      </p:grpSpPr>
+      <p:sp>
+        <p:nvSpPr>
+          <p:cNvPr id="2" name="Título 1">
+            <a:extLst>
+              <a:ext uri="{FF2B5EF4-FFF2-40B4-BE49-F238E27FC236}">
+                <a16:creationId xmlns:a16="http://schemas.microsoft.com/office/drawing/2014/main" id="{35E35DDC-39C2-4C12-80DA-B6A72EC4CAFC}"/>
+              </a:ext>
+            </a:extLst>
+          </p:cNvPr>
+          <p:cNvSpPr>
+            <a:spLocks noGrp="1"/>
+          </p:cNvSpPr>
+          <p:nvPr>
+            <p:ph type="title"/>
+          </p:nvPr>
+        </p:nvSpPr>
+        <p:spPr>
+          <a:xfrm>
+            <a:off x="-1" y="1"/>
+            <a:ext cx="3598877" cy="385894"/>
+          </a:xfrm>
+        </p:spPr>
+        <p:txBody>
+          <a:bodyPr>
+            <a:normAutofit/>
+          </a:bodyPr>
+          <a:lstStyle/>
+          <a:p>
+            <a:r>
+              <a:rPr lang="pt-BR" sz="1800" b="1" dirty="0"/>
+              <a:t>Diagrama de arquitetura local</a:t>
+            </a:r>
+          </a:p>
+        </p:txBody>
+      </p:sp>
+      <p:grpSp>
+        <p:nvGrpSpPr>
+          <p:cNvPr id="24" name="Agrupar 23">
+            <a:extLst>
+              <a:ext uri="{FF2B5EF4-FFF2-40B4-BE49-F238E27FC236}">
+                <a16:creationId xmlns:a16="http://schemas.microsoft.com/office/drawing/2014/main" id="{C7358C60-7117-4E43-9CBF-F695097D0E51}"/>
+              </a:ext>
+            </a:extLst>
+          </p:cNvPr>
+          <p:cNvGrpSpPr/>
+          <p:nvPr/>
+        </p:nvGrpSpPr>
+        <p:grpSpPr>
+          <a:xfrm>
+            <a:off x="220305" y="564740"/>
+            <a:ext cx="4019347" cy="1656744"/>
+            <a:chOff x="379513" y="801230"/>
+            <a:chExt cx="4019347" cy="1656744"/>
+          </a:xfrm>
+        </p:grpSpPr>
+        <p:sp>
+          <p:nvSpPr>
+            <p:cNvPr id="4" name="Retângulo 3">
+              <a:extLst>
+                <a:ext uri="{FF2B5EF4-FFF2-40B4-BE49-F238E27FC236}">
+                  <a16:creationId xmlns:a16="http://schemas.microsoft.com/office/drawing/2014/main" id="{404B2AB1-E98B-4928-8309-EE50151A41B6}"/>
+                </a:ext>
+              </a:extLst>
+            </p:cNvPr>
+            <p:cNvSpPr/>
+            <p:nvPr/>
+          </p:nvSpPr>
+          <p:spPr>
+            <a:xfrm>
+              <a:off x="385894" y="1082180"/>
+              <a:ext cx="3917658" cy="1375794"/>
+            </a:xfrm>
+            <a:prstGeom prst="rect">
+              <a:avLst/>
+            </a:prstGeom>
+            <a:noFill/>
+            <a:ln>
+              <a:solidFill>
+                <a:schemeClr val="tx1"/>
+              </a:solidFill>
+            </a:ln>
+          </p:spPr>
+          <p:style>
+            <a:lnRef idx="2">
+              <a:schemeClr val="accent1">
+                <a:shade val="50000"/>
+              </a:schemeClr>
+            </a:lnRef>
+            <a:fillRef idx="1">
+              <a:schemeClr val="accent1"/>
+            </a:fillRef>
+            <a:effectRef idx="0">
+              <a:schemeClr val="accent1"/>
+            </a:effectRef>
+            <a:fontRef idx="minor">
+              <a:schemeClr val="lt1"/>
+            </a:fontRef>
+          </p:style>
+          <p:txBody>
+            <a:bodyPr rtlCol="0" anchor="ctr"/>
+            <a:lstStyle/>
+            <a:p>
+              <a:pPr algn="ctr"/>
+              <a:endParaRPr lang="pt-BR" dirty="0"/>
+            </a:p>
+          </p:txBody>
+        </p:sp>
+        <p:pic>
+          <p:nvPicPr>
+            <p:cNvPr id="1028" name="Picture 4" descr="Adaptador Microcontrolador Arduino Uno R3 - R$ 6,00 em Mercado Livre">
+              <a:extLst>
+                <a:ext uri="{FF2B5EF4-FFF2-40B4-BE49-F238E27FC236}">
+                  <a16:creationId xmlns:a16="http://schemas.microsoft.com/office/drawing/2014/main" id="{BE0EDE55-0036-44C0-B198-4EF79058E232}"/>
+                </a:ext>
+              </a:extLst>
+            </p:cNvPr>
+            <p:cNvPicPr>
+              <a:picLocks noChangeAspect="1" noChangeArrowheads="1"/>
+            </p:cNvPicPr>
+            <p:nvPr/>
+          </p:nvPicPr>
+          <p:blipFill>
+            <a:blip r:embed="rId2">
+              <a:extLst>
+                <a:ext uri="{BEBA8EAE-BF5A-486C-A8C5-ECC9F3942E4B}">
+                  <a14:imgProps xmlns:a14="http://schemas.microsoft.com/office/drawing/2010/main">
+                    <a14:imgLayer r:embed="rId3">
+                      <a14:imgEffect>
+                        <a14:backgroundRemoval t="4774" b="89841" l="917" r="97583">
+                          <a14:foregroundMark x1="5250" y1="35373" x2="5250" y2="35373"/>
+                          <a14:foregroundMark x1="4917" y1="34884" x2="14667" y2="12729"/>
+                          <a14:foregroundMark x1="14667" y1="12729" x2="14833" y2="12729"/>
+                          <a14:foregroundMark x1="24083" y1="8568" x2="41083" y2="17870"/>
+                          <a14:foregroundMark x1="41083" y1="17870" x2="49667" y2="34884"/>
+                          <a14:foregroundMark x1="46917" y1="40392" x2="33500" y2="58262"/>
+                          <a14:foregroundMark x1="33500" y1="58262" x2="15250" y2="63280"/>
+                          <a14:foregroundMark x1="15250" y1="63280" x2="1333" y2="45043"/>
+                          <a14:foregroundMark x1="1333" y1="45043" x2="917" y2="38556"/>
+                          <a14:foregroundMark x1="4583" y1="27662" x2="4583" y2="27662"/>
+                          <a14:foregroundMark x1="4583" y1="27662" x2="4583" y2="27662"/>
+                          <a14:foregroundMark x1="4583" y1="27662" x2="4583" y2="27662"/>
+                          <a14:foregroundMark x1="6750" y1="22277" x2="1500" y2="34027"/>
+                          <a14:foregroundMark x1="6750" y1="17258" x2="24333" y2="8201"/>
+                          <a14:foregroundMark x1="24333" y1="8201" x2="39500" y2="16279"/>
+                          <a14:foregroundMark x1="46583" y1="22644" x2="32500" y2="4774"/>
+                          <a14:foregroundMark x1="32500" y1="4774" x2="17583" y2="5018"/>
+                          <a14:foregroundMark x1="94167" y1="40759" x2="94167" y2="40759"/>
+                          <a14:foregroundMark x1="94167" y1="40392" x2="94167" y2="40392"/>
+                          <a14:foregroundMark x1="94167" y1="40392" x2="94167" y2="40392"/>
+                          <a14:foregroundMark x1="94500" y1="31334" x2="94500" y2="31334"/>
+                          <a14:foregroundMark x1="50333" y1="28152" x2="64833" y2="12118"/>
+                          <a14:foregroundMark x1="64833" y1="12118" x2="81667" y2="5018"/>
+                          <a14:foregroundMark x1="81667" y1="5018" x2="95417" y2="21542"/>
+                          <a14:foregroundMark x1="95417" y1="21542" x2="92833" y2="47124"/>
+                          <a14:foregroundMark x1="92833" y1="47124" x2="78667" y2="62546"/>
+                          <a14:foregroundMark x1="78667" y1="62546" x2="60750" y2="60465"/>
+                          <a14:foregroundMark x1="60750" y1="60465" x2="52750" y2="42228"/>
+                          <a14:foregroundMark x1="73750" y1="26316" x2="75333" y2="42595"/>
+                          <a14:foregroundMark x1="19417" y1="33537" x2="32083" y2="33537"/>
+                          <a14:foregroundMark x1="96667" y1="29498" x2="97583" y2="41738"/>
+                        </a14:backgroundRemoval>
+                      </a14:imgEffect>
+                    </a14:imgLayer>
+                  </a14:imgProps>
+                </a:ext>
+                <a:ext uri="{28A0092B-C50C-407E-A947-70E740481C1C}">
+                  <a14:useLocalDpi xmlns:a14="http://schemas.microsoft.com/office/drawing/2010/main" val="0"/>
+                </a:ext>
+              </a:extLst>
+            </a:blip>
+            <a:srcRect/>
+            <a:stretch>
+              <a:fillRect/>
+            </a:stretch>
+          </p:blipFill>
+          <p:spPr bwMode="auto">
+            <a:xfrm>
+              <a:off x="1650315" y="1327306"/>
+              <a:ext cx="990958" cy="674695"/>
+            </a:xfrm>
+            <a:prstGeom prst="rect">
+              <a:avLst/>
+            </a:prstGeom>
+            <a:noFill/>
+            <a:extLst>
+              <a:ext uri="{909E8E84-426E-40DD-AFC4-6F175D3DCCD1}">
+                <a14:hiddenFill xmlns:a14="http://schemas.microsoft.com/office/drawing/2010/main">
+                  <a:solidFill>
+                    <a:srgbClr val="FFFFFF"/>
+                  </a:solidFill>
+                </a14:hiddenFill>
+              </a:ext>
+            </a:extLst>
+          </p:spPr>
+        </p:pic>
+        <p:pic>
+          <p:nvPicPr>
+            <p:cNvPr id="1032" name="Picture 8" descr="Sensor Icons - Download Free Vector Icons | Noun Project">
+              <a:extLst>
+                <a:ext uri="{FF2B5EF4-FFF2-40B4-BE49-F238E27FC236}">
+                  <a16:creationId xmlns:a16="http://schemas.microsoft.com/office/drawing/2014/main" id="{5C0FD2CC-A4FB-4B2D-BB10-C86003BF541A}"/>
+                </a:ext>
+              </a:extLst>
+            </p:cNvPr>
+            <p:cNvPicPr>
+              <a:picLocks noChangeAspect="1" noChangeArrowheads="1"/>
+            </p:cNvPicPr>
+            <p:nvPr/>
+          </p:nvPicPr>
+          <p:blipFill>
+            <a:blip r:embed="rId4">
+              <a:extLst>
+                <a:ext uri="{28A0092B-C50C-407E-A947-70E740481C1C}">
+                  <a14:useLocalDpi xmlns:a14="http://schemas.microsoft.com/office/drawing/2010/main" val="0"/>
+                </a:ext>
+              </a:extLst>
+            </a:blip>
+            <a:srcRect/>
+            <a:stretch>
+              <a:fillRect/>
+            </a:stretch>
+          </p:blipFill>
+          <p:spPr bwMode="auto">
+            <a:xfrm>
+              <a:off x="379513" y="1174378"/>
+              <a:ext cx="826315" cy="826315"/>
+            </a:xfrm>
+            <a:prstGeom prst="rect">
+              <a:avLst/>
+            </a:prstGeom>
+            <a:noFill/>
+            <a:extLst>
+              <a:ext uri="{909E8E84-426E-40DD-AFC4-6F175D3DCCD1}">
+                <a14:hiddenFill xmlns:a14="http://schemas.microsoft.com/office/drawing/2010/main">
+                  <a:solidFill>
+                    <a:srgbClr val="FFFFFF"/>
+                  </a:solidFill>
+                </a14:hiddenFill>
+              </a:ext>
+            </a:extLst>
+          </p:spPr>
+        </p:pic>
+        <p:grpSp>
+          <p:nvGrpSpPr>
+            <p:cNvPr id="5" name="Agrupar 4">
+              <a:extLst>
+                <a:ext uri="{FF2B5EF4-FFF2-40B4-BE49-F238E27FC236}">
+                  <a16:creationId xmlns:a16="http://schemas.microsoft.com/office/drawing/2014/main" id="{DAED1DDB-6677-4C50-B752-A07B2C9FDEF7}"/>
+                </a:ext>
+              </a:extLst>
+            </p:cNvPr>
+            <p:cNvGrpSpPr/>
+            <p:nvPr/>
+          </p:nvGrpSpPr>
+          <p:grpSpPr>
+            <a:xfrm>
+              <a:off x="3044052" y="1216993"/>
+              <a:ext cx="990958" cy="674695"/>
+              <a:chOff x="5335399" y="2416027"/>
+              <a:chExt cx="2054852" cy="1622845"/>
+            </a:xfrm>
+          </p:grpSpPr>
+          <p:pic>
+            <p:nvPicPr>
+              <p:cNvPr id="1036" name="Picture 12" descr="Notebook Svg Png Icon Free Download (#533755) - OnlineWebFonts.COM">
+                <a:extLst>
+                  <a:ext uri="{FF2B5EF4-FFF2-40B4-BE49-F238E27FC236}">
+                    <a16:creationId xmlns:a16="http://schemas.microsoft.com/office/drawing/2014/main" id="{539A607E-3F33-4CD6-9F8C-11BA12685ACA}"/>
+                  </a:ext>
+                </a:extLst>
+              </p:cNvPr>
+              <p:cNvPicPr>
+                <a:picLocks noChangeAspect="1" noChangeArrowheads="1"/>
+              </p:cNvPicPr>
+              <p:nvPr/>
+            </p:nvPicPr>
+            <p:blipFill>
+              <a:blip r:embed="rId5">
+                <a:extLst>
+                  <a:ext uri="{28A0092B-C50C-407E-A947-70E740481C1C}">
+                    <a14:useLocalDpi xmlns:a14="http://schemas.microsoft.com/office/drawing/2010/main" val="0"/>
+                  </a:ext>
+                </a:extLst>
+              </a:blip>
+              <a:srcRect/>
+              <a:stretch>
+                <a:fillRect/>
+              </a:stretch>
+            </p:blipFill>
+            <p:spPr bwMode="auto">
+              <a:xfrm>
+                <a:off x="5335399" y="2416027"/>
+                <a:ext cx="2054852" cy="1622845"/>
+              </a:xfrm>
+              <a:prstGeom prst="rect">
+                <a:avLst/>
+              </a:prstGeom>
+              <a:noFill/>
+              <a:extLst>
+                <a:ext uri="{909E8E84-426E-40DD-AFC4-6F175D3DCCD1}">
+                  <a14:hiddenFill xmlns:a14="http://schemas.microsoft.com/office/drawing/2010/main">
+                    <a:solidFill>
+                      <a:srgbClr val="FFFFFF"/>
+                    </a:solidFill>
+                  </a14:hiddenFill>
+                </a:ext>
+              </a:extLst>
+            </p:spPr>
+          </p:pic>
+          <p:pic>
+            <p:nvPicPr>
+              <p:cNvPr id="1040" name="Picture 16" descr="Estrutura de diretórios e arquivos em projetos Node.js - Waldemar ...">
+                <a:extLst>
+                  <a:ext uri="{FF2B5EF4-FFF2-40B4-BE49-F238E27FC236}">
+                    <a16:creationId xmlns:a16="http://schemas.microsoft.com/office/drawing/2014/main" id="{E9587EDB-B240-4033-AC00-DD4BE6988D6C}"/>
+                  </a:ext>
+                </a:extLst>
+              </p:cNvPr>
+              <p:cNvPicPr>
+                <a:picLocks noChangeAspect="1" noChangeArrowheads="1"/>
+              </p:cNvPicPr>
+              <p:nvPr/>
+            </p:nvPicPr>
+            <p:blipFill>
+              <a:blip r:embed="rId6">
+                <a:extLst>
+                  <a:ext uri="{28A0092B-C50C-407E-A947-70E740481C1C}">
+                    <a14:useLocalDpi xmlns:a14="http://schemas.microsoft.com/office/drawing/2010/main" val="0"/>
+                  </a:ext>
+                </a:extLst>
+              </a:blip>
+              <a:srcRect/>
+              <a:stretch>
+                <a:fillRect/>
+              </a:stretch>
+            </p:blipFill>
+            <p:spPr bwMode="auto">
+              <a:xfrm>
+                <a:off x="5994933" y="2537670"/>
+                <a:ext cx="708870" cy="708870"/>
+              </a:xfrm>
+              <a:prstGeom prst="rect">
+                <a:avLst/>
+              </a:prstGeom>
+              <a:noFill/>
+              <a:extLst>
+                <a:ext uri="{909E8E84-426E-40DD-AFC4-6F175D3DCCD1}">
+                  <a14:hiddenFill xmlns:a14="http://schemas.microsoft.com/office/drawing/2010/main">
+                    <a:solidFill>
+                      <a:srgbClr val="FFFFFF"/>
+                    </a:solidFill>
+                  </a14:hiddenFill>
+                </a:ext>
+              </a:extLst>
+            </p:spPr>
+          </p:pic>
+        </p:grpSp>
+        <p:sp>
+          <p:nvSpPr>
+            <p:cNvPr id="6" name="CaixaDeTexto 5">
+              <a:extLst>
+                <a:ext uri="{FF2B5EF4-FFF2-40B4-BE49-F238E27FC236}">
+                  <a16:creationId xmlns:a16="http://schemas.microsoft.com/office/drawing/2014/main" id="{3CB6E188-F52B-474D-89F2-F3BD304CA430}"/>
+                </a:ext>
+              </a:extLst>
+            </p:cNvPr>
+            <p:cNvSpPr txBox="1"/>
+            <p:nvPr/>
+          </p:nvSpPr>
+          <p:spPr>
+            <a:xfrm>
+              <a:off x="472386" y="1968377"/>
+              <a:ext cx="792582" cy="261610"/>
+            </a:xfrm>
+            <a:prstGeom prst="rect">
+              <a:avLst/>
+            </a:prstGeom>
+            <a:noFill/>
+          </p:spPr>
+          <p:txBody>
+            <a:bodyPr wrap="square" rtlCol="0">
+              <a:spAutoFit/>
+            </a:bodyPr>
+            <a:lstStyle/>
+            <a:p>
+              <a:r>
+                <a:rPr lang="pt-BR" sz="1100" dirty="0"/>
+                <a:t>SENSOR</a:t>
+              </a:r>
+              <a:endParaRPr lang="pt-BR" sz="1400" dirty="0"/>
+            </a:p>
+          </p:txBody>
+        </p:sp>
+        <p:sp>
+          <p:nvSpPr>
+            <p:cNvPr id="7" name="CaixaDeTexto 6">
+              <a:extLst>
+                <a:ext uri="{FF2B5EF4-FFF2-40B4-BE49-F238E27FC236}">
+                  <a16:creationId xmlns:a16="http://schemas.microsoft.com/office/drawing/2014/main" id="{AD59044E-0299-4417-8D37-233585F386B6}"/>
+                </a:ext>
+              </a:extLst>
+            </p:cNvPr>
+            <p:cNvSpPr txBox="1"/>
+            <p:nvPr/>
+          </p:nvSpPr>
+          <p:spPr>
+            <a:xfrm>
+              <a:off x="1730944" y="1968377"/>
+              <a:ext cx="739305" cy="261610"/>
+            </a:xfrm>
+            <a:prstGeom prst="rect">
+              <a:avLst/>
+            </a:prstGeom>
+            <a:noFill/>
+          </p:spPr>
+          <p:txBody>
+            <a:bodyPr wrap="none" rtlCol="0">
+              <a:spAutoFit/>
+            </a:bodyPr>
+            <a:lstStyle/>
+            <a:p>
+              <a:r>
+                <a:rPr lang="pt-BR" sz="1100" dirty="0"/>
+                <a:t>ARDUÍNO</a:t>
+              </a:r>
+              <a:endParaRPr lang="pt-BR" dirty="0"/>
+            </a:p>
+          </p:txBody>
+        </p:sp>
+        <p:sp>
+          <p:nvSpPr>
+            <p:cNvPr id="8" name="CaixaDeTexto 7">
+              <a:extLst>
+                <a:ext uri="{FF2B5EF4-FFF2-40B4-BE49-F238E27FC236}">
+                  <a16:creationId xmlns:a16="http://schemas.microsoft.com/office/drawing/2014/main" id="{066BF58F-947B-4FEA-9C62-E4176C84D4E4}"/>
+                </a:ext>
+              </a:extLst>
+            </p:cNvPr>
+            <p:cNvSpPr txBox="1"/>
+            <p:nvPr/>
+          </p:nvSpPr>
+          <p:spPr>
+            <a:xfrm>
+              <a:off x="3346131" y="1968897"/>
+              <a:ext cx="373820" cy="261610"/>
+            </a:xfrm>
+            <a:prstGeom prst="rect">
+              <a:avLst/>
+            </a:prstGeom>
+            <a:noFill/>
+          </p:spPr>
+          <p:txBody>
+            <a:bodyPr wrap="none" rtlCol="0">
+              <a:spAutoFit/>
+            </a:bodyPr>
+            <a:lstStyle/>
+            <a:p>
+              <a:r>
+                <a:rPr lang="pt-BR" sz="1100" dirty="0"/>
+                <a:t>API</a:t>
+              </a:r>
+              <a:endParaRPr lang="pt-BR" dirty="0"/>
+            </a:p>
+          </p:txBody>
+        </p:sp>
+        <p:sp>
+          <p:nvSpPr>
+            <p:cNvPr id="10" name="CaixaDeTexto 9">
+              <a:extLst>
+                <a:ext uri="{FF2B5EF4-FFF2-40B4-BE49-F238E27FC236}">
+                  <a16:creationId xmlns:a16="http://schemas.microsoft.com/office/drawing/2014/main" id="{46DD14A8-D97F-41F9-AA40-9550B1AD9D00}"/>
+                </a:ext>
+              </a:extLst>
+            </p:cNvPr>
+            <p:cNvSpPr txBox="1"/>
+            <p:nvPr/>
+          </p:nvSpPr>
+          <p:spPr>
+            <a:xfrm>
+              <a:off x="3671160" y="801230"/>
+              <a:ext cx="727700" cy="338554"/>
+            </a:xfrm>
+            <a:prstGeom prst="rect">
+              <a:avLst/>
+            </a:prstGeom>
+            <a:noFill/>
+          </p:spPr>
+          <p:txBody>
+            <a:bodyPr wrap="none" rtlCol="0">
+              <a:spAutoFit/>
+            </a:bodyPr>
+            <a:lstStyle/>
+            <a:p>
+              <a:r>
+                <a:rPr lang="pt-BR" sz="1600" b="1" dirty="0"/>
+                <a:t>LOCAL</a:t>
+              </a:r>
+              <a:endParaRPr lang="pt-BR" b="1" dirty="0"/>
+            </a:p>
+          </p:txBody>
+        </p:sp>
+        <p:cxnSp>
+          <p:nvCxnSpPr>
+            <p:cNvPr id="12" name="Conector de Seta Reta 11">
+              <a:extLst>
+                <a:ext uri="{FF2B5EF4-FFF2-40B4-BE49-F238E27FC236}">
+                  <a16:creationId xmlns:a16="http://schemas.microsoft.com/office/drawing/2014/main" id="{D63F034A-C699-4B19-9044-CBF8C682F9BD}"/>
+                </a:ext>
+              </a:extLst>
+            </p:cNvPr>
+            <p:cNvCxnSpPr>
+              <a:cxnSpLocks/>
+            </p:cNvCxnSpPr>
+            <p:nvPr/>
+          </p:nvCxnSpPr>
+          <p:spPr>
+            <a:xfrm flipV="1">
+              <a:off x="2641273" y="1579973"/>
+              <a:ext cx="402779" cy="1"/>
+            </a:xfrm>
+            <a:prstGeom prst="straightConnector1">
+              <a:avLst/>
+            </a:prstGeom>
+            <a:ln>
+              <a:solidFill>
+                <a:schemeClr val="tx1"/>
+              </a:solidFill>
+              <a:tailEnd type="triangle"/>
+            </a:ln>
+          </p:spPr>
+          <p:style>
+            <a:lnRef idx="1">
+              <a:schemeClr val="accent1"/>
+            </a:lnRef>
+            <a:fillRef idx="0">
+              <a:schemeClr val="accent1"/>
+            </a:fillRef>
+            <a:effectRef idx="0">
+              <a:schemeClr val="accent1"/>
+            </a:effectRef>
+            <a:fontRef idx="minor">
+              <a:schemeClr val="tx1"/>
+            </a:fontRef>
+          </p:style>
+        </p:cxnSp>
+        <p:cxnSp>
+          <p:nvCxnSpPr>
+            <p:cNvPr id="14" name="Conector de Seta Reta 13">
+              <a:extLst>
+                <a:ext uri="{FF2B5EF4-FFF2-40B4-BE49-F238E27FC236}">
+                  <a16:creationId xmlns:a16="http://schemas.microsoft.com/office/drawing/2014/main" id="{0A706BFD-FD40-4EE5-8796-B362E3F8A381}"/>
+                </a:ext>
+              </a:extLst>
+            </p:cNvPr>
+            <p:cNvCxnSpPr>
+              <a:cxnSpLocks/>
+            </p:cNvCxnSpPr>
+            <p:nvPr/>
+          </p:nvCxnSpPr>
+          <p:spPr>
+            <a:xfrm flipH="1">
+              <a:off x="1194778" y="1587535"/>
+              <a:ext cx="455537" cy="0"/>
+            </a:xfrm>
+            <a:prstGeom prst="straightConnector1">
+              <a:avLst/>
+            </a:prstGeom>
+            <a:ln>
+              <a:solidFill>
+                <a:schemeClr val="tx1"/>
+              </a:solidFill>
+              <a:tailEnd type="triangle"/>
+            </a:ln>
+          </p:spPr>
+          <p:style>
+            <a:lnRef idx="1">
+              <a:schemeClr val="accent1"/>
+            </a:lnRef>
+            <a:fillRef idx="0">
+              <a:schemeClr val="accent1"/>
+            </a:fillRef>
+            <a:effectRef idx="0">
+              <a:schemeClr val="accent1"/>
+            </a:effectRef>
+            <a:fontRef idx="minor">
+              <a:schemeClr val="tx1"/>
+            </a:fontRef>
+          </p:style>
+        </p:cxnSp>
+      </p:grpSp>
+      <p:grpSp>
+        <p:nvGrpSpPr>
+          <p:cNvPr id="26" name="Agrupar 25">
+            <a:extLst>
+              <a:ext uri="{FF2B5EF4-FFF2-40B4-BE49-F238E27FC236}">
+                <a16:creationId xmlns:a16="http://schemas.microsoft.com/office/drawing/2014/main" id="{F8DC07BF-EEDD-4E17-A03E-8C4A83908583}"/>
+              </a:ext>
+            </a:extLst>
+          </p:cNvPr>
+          <p:cNvGrpSpPr/>
+          <p:nvPr/>
+        </p:nvGrpSpPr>
+        <p:grpSpPr>
+          <a:xfrm>
+            <a:off x="226686" y="2910223"/>
+            <a:ext cx="5543676" cy="3452588"/>
+            <a:chOff x="183966" y="2553419"/>
+            <a:chExt cx="5543676" cy="3452588"/>
+          </a:xfrm>
+        </p:grpSpPr>
+        <p:grpSp>
+          <p:nvGrpSpPr>
+            <p:cNvPr id="23" name="Agrupar 22">
+              <a:extLst>
+                <a:ext uri="{FF2B5EF4-FFF2-40B4-BE49-F238E27FC236}">
+                  <a16:creationId xmlns:a16="http://schemas.microsoft.com/office/drawing/2014/main" id="{43511ABB-506C-4A08-BF36-0320F6609B6A}"/>
+                </a:ext>
+              </a:extLst>
+            </p:cNvPr>
+            <p:cNvGrpSpPr/>
+            <p:nvPr/>
+          </p:nvGrpSpPr>
+          <p:grpSpPr>
+            <a:xfrm>
+              <a:off x="183966" y="2665828"/>
+              <a:ext cx="5490684" cy="3340179"/>
+              <a:chOff x="2804557" y="2428868"/>
+              <a:chExt cx="5419367" cy="3424888"/>
+            </a:xfrm>
+          </p:grpSpPr>
+          <p:grpSp>
+            <p:nvGrpSpPr>
+              <p:cNvPr id="22" name="Agrupar 21">
+                <a:extLst>
+                  <a:ext uri="{FF2B5EF4-FFF2-40B4-BE49-F238E27FC236}">
+                    <a16:creationId xmlns:a16="http://schemas.microsoft.com/office/drawing/2014/main" id="{DBF248F5-F515-49BF-9D83-08CCE83438C7}"/>
+                  </a:ext>
+                </a:extLst>
+              </p:cNvPr>
+              <p:cNvGrpSpPr/>
+              <p:nvPr/>
+            </p:nvGrpSpPr>
+            <p:grpSpPr>
+              <a:xfrm>
+                <a:off x="2804557" y="2592787"/>
+                <a:ext cx="5381262" cy="3260969"/>
+                <a:chOff x="2842662" y="2535183"/>
+                <a:chExt cx="5381262" cy="3260969"/>
+              </a:xfrm>
+            </p:grpSpPr>
+            <p:sp>
+              <p:nvSpPr>
+                <p:cNvPr id="19" name="Retângulo 18">
+                  <a:extLst>
+                    <a:ext uri="{FF2B5EF4-FFF2-40B4-BE49-F238E27FC236}">
+                      <a16:creationId xmlns:a16="http://schemas.microsoft.com/office/drawing/2014/main" id="{E80C0160-DFCE-43B4-AEA3-B1C74A6C9461}"/>
+                    </a:ext>
+                  </a:extLst>
+                </p:cNvPr>
+                <p:cNvSpPr/>
+                <p:nvPr/>
+              </p:nvSpPr>
+              <p:spPr>
+                <a:xfrm>
+                  <a:off x="2842662" y="2535183"/>
+                  <a:ext cx="5381262" cy="3260969"/>
+                </a:xfrm>
+                <a:prstGeom prst="rect">
+                  <a:avLst/>
+                </a:prstGeom>
+                <a:noFill/>
+                <a:ln>
+                  <a:solidFill>
+                    <a:schemeClr val="tx1"/>
+                  </a:solidFill>
+                </a:ln>
+              </p:spPr>
+              <p:style>
+                <a:lnRef idx="2">
+                  <a:schemeClr val="accent1">
+                    <a:shade val="50000"/>
+                  </a:schemeClr>
+                </a:lnRef>
+                <a:fillRef idx="1">
+                  <a:schemeClr val="accent1"/>
+                </a:fillRef>
+                <a:effectRef idx="0">
+                  <a:schemeClr val="accent1"/>
+                </a:effectRef>
+                <a:fontRef idx="minor">
+                  <a:schemeClr val="lt1"/>
+                </a:fontRef>
+              </p:style>
+              <p:txBody>
+                <a:bodyPr rtlCol="0" anchor="ctr"/>
+                <a:lstStyle/>
+                <a:p>
+                  <a:pPr algn="ctr"/>
+                  <a:endParaRPr lang="pt-BR" dirty="0"/>
+                </a:p>
+              </p:txBody>
+            </p:sp>
+            <p:pic>
+              <p:nvPicPr>
+                <p:cNvPr id="29" name="Picture 16" descr="Estrutura de diretórios e arquivos em projetos Node.js - Waldemar ...">
+                  <a:extLst>
+                    <a:ext uri="{FF2B5EF4-FFF2-40B4-BE49-F238E27FC236}">
+                      <a16:creationId xmlns:a16="http://schemas.microsoft.com/office/drawing/2014/main" id="{177510E4-E7A9-45F3-933C-6A1741765975}"/>
+                    </a:ext>
+                  </a:extLst>
+                </p:cNvPr>
+                <p:cNvPicPr>
+                  <a:picLocks noChangeAspect="1" noChangeArrowheads="1"/>
+                </p:cNvPicPr>
+                <p:nvPr/>
+              </p:nvPicPr>
+              <p:blipFill>
+                <a:blip r:embed="rId6">
+                  <a:extLst>
+                    <a:ext uri="{28A0092B-C50C-407E-A947-70E740481C1C}">
+                      <a14:useLocalDpi xmlns:a14="http://schemas.microsoft.com/office/drawing/2010/main" val="0"/>
+                    </a:ext>
+                  </a:extLst>
+                </a:blip>
+                <a:srcRect/>
+                <a:stretch>
+                  <a:fillRect/>
+                </a:stretch>
+              </p:blipFill>
+              <p:spPr bwMode="auto">
+                <a:xfrm>
+                  <a:off x="3324225" y="4340920"/>
+                  <a:ext cx="1018310" cy="877881"/>
+                </a:xfrm>
+                <a:prstGeom prst="rect">
+                  <a:avLst/>
+                </a:prstGeom>
+                <a:noFill/>
+                <a:extLst>
+                  <a:ext uri="{909E8E84-426E-40DD-AFC4-6F175D3DCCD1}">
+                    <a14:hiddenFill xmlns:a14="http://schemas.microsoft.com/office/drawing/2010/main">
+                      <a:solidFill>
+                        <a:srgbClr val="FFFFFF"/>
+                      </a:solidFill>
+                    </a14:hiddenFill>
+                  </a:ext>
+                </a:extLst>
+              </p:spPr>
+            </p:pic>
+            <p:pic>
+              <p:nvPicPr>
+                <p:cNvPr id="1046" name="Picture 22" descr="API &amp; Developers | CallPage">
+                  <a:extLst>
+                    <a:ext uri="{FF2B5EF4-FFF2-40B4-BE49-F238E27FC236}">
+                      <a16:creationId xmlns:a16="http://schemas.microsoft.com/office/drawing/2014/main" id="{2C2DDA59-0EC7-4174-A34F-B700487E2D32}"/>
+                    </a:ext>
+                  </a:extLst>
+                </p:cNvPr>
+                <p:cNvPicPr>
+                  <a:picLocks noChangeAspect="1" noChangeArrowheads="1"/>
+                </p:cNvPicPr>
+                <p:nvPr/>
+              </p:nvPicPr>
+              <p:blipFill>
+                <a:blip r:embed="rId7">
+                  <a:extLst>
+                    <a:ext uri="{BEBA8EAE-BF5A-486C-A8C5-ECC9F3942E4B}">
+                      <a14:imgProps xmlns:a14="http://schemas.microsoft.com/office/drawing/2010/main">
+                        <a14:imgLayer r:embed="rId8">
+                          <a14:imgEffect>
+                            <a14:backgroundRemoval t="1754" b="96930" l="1810" r="95928">
+                              <a14:foregroundMark x1="19457" y1="18421" x2="14480" y2="16228"/>
+                              <a14:foregroundMark x1="4977" y1="28070" x2="2262" y2="35088"/>
+                              <a14:foregroundMark x1="36199" y1="92982" x2="38462" y2="97368"/>
+                              <a14:foregroundMark x1="93665" y1="60526" x2="96380" y2="62719"/>
+                              <a14:foregroundMark x1="61991" y1="5263" x2="61991" y2="5263"/>
+                              <a14:foregroundMark x1="53394" y1="1754" x2="53394" y2="1754"/>
+                              <a14:foregroundMark x1="63801" y1="16667" x2="63801" y2="16667"/>
+                              <a14:foregroundMark x1="79638" y1="27193" x2="79638" y2="27193"/>
+                              <a14:foregroundMark x1="36652" y1="49123" x2="36652" y2="49123"/>
+                              <a14:foregroundMark x1="49321" y1="47368" x2="49321" y2="47368"/>
+                              <a14:foregroundMark x1="64253" y1="47368" x2="64253" y2="47368"/>
+                              <a14:foregroundMark x1="19005" y1="68421" x2="19005" y2="68421"/>
+                              <a14:foregroundMark x1="27149" y1="79386" x2="27149" y2="79386"/>
+                              <a14:backgroundMark x1="35747" y1="92544" x2="35747" y2="92544"/>
+                            </a14:backgroundRemoval>
+                          </a14:imgEffect>
+                        </a14:imgLayer>
+                      </a14:imgProps>
+                    </a:ext>
+                    <a:ext uri="{28A0092B-C50C-407E-A947-70E740481C1C}">
+                      <a14:useLocalDpi xmlns:a14="http://schemas.microsoft.com/office/drawing/2010/main" val="0"/>
+                    </a:ext>
+                  </a:extLst>
+                </a:blip>
+                <a:srcRect/>
+                <a:stretch>
+                  <a:fillRect/>
+                </a:stretch>
+              </p:blipFill>
+              <p:spPr bwMode="auto">
+                <a:xfrm>
+                  <a:off x="4090147" y="3348083"/>
+                  <a:ext cx="805459" cy="830971"/>
+                </a:xfrm>
+                <a:prstGeom prst="rect">
+                  <a:avLst/>
+                </a:prstGeom>
+                <a:noFill/>
+                <a:ln>
+                  <a:noFill/>
+                </a:ln>
+                <a:extLst>
+                  <a:ext uri="{909E8E84-426E-40DD-AFC4-6F175D3DCCD1}">
+                    <a14:hiddenFill xmlns:a14="http://schemas.microsoft.com/office/drawing/2010/main">
+                      <a:solidFill>
+                        <a:srgbClr val="FFFFFF"/>
+                      </a:solidFill>
+                    </a14:hiddenFill>
+                  </a:ext>
+                </a:extLst>
+              </p:spPr>
+            </p:pic>
+            <p:pic>
+              <p:nvPicPr>
+                <p:cNvPr id="1050" name="Picture 26" descr="Amazon SQL Server Cloud - AWS">
+                  <a:extLst>
+                    <a:ext uri="{FF2B5EF4-FFF2-40B4-BE49-F238E27FC236}">
+                      <a16:creationId xmlns:a16="http://schemas.microsoft.com/office/drawing/2014/main" id="{E6F7FB0A-E298-4A2E-9CED-E7B1EA863800}"/>
+                    </a:ext>
+                  </a:extLst>
+                </p:cNvPr>
+                <p:cNvPicPr>
+                  <a:picLocks noChangeAspect="1" noChangeArrowheads="1"/>
+                </p:cNvPicPr>
+                <p:nvPr/>
+              </p:nvPicPr>
+              <p:blipFill>
+                <a:blip r:embed="rId9">
+                  <a:extLst>
+                    <a:ext uri="{28A0092B-C50C-407E-A947-70E740481C1C}">
+                      <a14:useLocalDpi xmlns:a14="http://schemas.microsoft.com/office/drawing/2010/main" val="0"/>
+                    </a:ext>
+                  </a:extLst>
+                </a:blip>
+                <a:srcRect/>
+                <a:stretch>
+                  <a:fillRect/>
+                </a:stretch>
+              </p:blipFill>
+              <p:spPr bwMode="auto">
+                <a:xfrm>
+                  <a:off x="4895606" y="3771160"/>
+                  <a:ext cx="1386466" cy="1139520"/>
+                </a:xfrm>
+                <a:prstGeom prst="rect">
+                  <a:avLst/>
+                </a:prstGeom>
+                <a:noFill/>
+                <a:extLst>
+                  <a:ext uri="{909E8E84-426E-40DD-AFC4-6F175D3DCCD1}">
+                    <a14:hiddenFill xmlns:a14="http://schemas.microsoft.com/office/drawing/2010/main">
+                      <a:solidFill>
+                        <a:srgbClr val="FFFFFF"/>
+                      </a:solidFill>
+                    </a14:hiddenFill>
+                  </a:ext>
+                </a:extLst>
+              </p:spPr>
+            </p:pic>
+            <p:sp>
+              <p:nvSpPr>
+                <p:cNvPr id="20" name="AutoShape 28" descr="Segurança do Office 365 - SonicWall">
+                  <a:extLst>
+                    <a:ext uri="{FF2B5EF4-FFF2-40B4-BE49-F238E27FC236}">
+                      <a16:creationId xmlns:a16="http://schemas.microsoft.com/office/drawing/2014/main" id="{44BC553F-9762-4F99-849A-7B3739419EAC}"/>
+                    </a:ext>
+                  </a:extLst>
+                </p:cNvPr>
+                <p:cNvSpPr>
+                  <a:spLocks noChangeAspect="1" noChangeArrowheads="1"/>
+                </p:cNvSpPr>
+                <p:nvPr/>
+              </p:nvSpPr>
+              <p:spPr bwMode="auto">
+                <a:xfrm>
+                  <a:off x="5943600" y="3276600"/>
+                  <a:ext cx="304800" cy="304800"/>
+                </a:xfrm>
+                <a:prstGeom prst="rect">
+                  <a:avLst/>
+                </a:prstGeom>
+                <a:noFill/>
+                <a:extLst>
+                  <a:ext uri="{909E8E84-426E-40DD-AFC4-6F175D3DCCD1}">
+                    <a14:hiddenFill xmlns:a14="http://schemas.microsoft.com/office/drawing/2010/main">
+                      <a:solidFill>
+                        <a:srgbClr val="FFFFFF"/>
+                      </a:solidFill>
+                    </a14:hiddenFill>
+                  </a:ext>
+                </a:extLst>
+              </p:spPr>
+              <p:txBody>
+                <a:bodyPr vert="horz" wrap="square" lIns="91440" tIns="45720" rIns="91440" bIns="45720" numCol="1" anchor="t" anchorCtr="0" compatLnSpc="1">
+                  <a:prstTxWarp prst="textNoShape">
+                    <a:avLst/>
+                  </a:prstTxWarp>
+                </a:bodyPr>
+                <a:lstStyle/>
+                <a:p>
+                  <a:endParaRPr lang="pt-BR"/>
+                </a:p>
+              </p:txBody>
+            </p:sp>
+            <p:pic>
+              <p:nvPicPr>
+                <p:cNvPr id="1058" name="Picture 34" descr="OwnerBox(オーナーボックス) - 不動産オーナー向け資産管理クラウド ...">
+                  <a:extLst>
+                    <a:ext uri="{FF2B5EF4-FFF2-40B4-BE49-F238E27FC236}">
+                      <a16:creationId xmlns:a16="http://schemas.microsoft.com/office/drawing/2014/main" id="{412A0CB7-41F5-4C88-925E-4583DDE1DC4E}"/>
+                    </a:ext>
+                  </a:extLst>
+                </p:cNvPr>
+                <p:cNvPicPr>
+                  <a:picLocks noChangeAspect="1" noChangeArrowheads="1"/>
+                </p:cNvPicPr>
+                <p:nvPr/>
+              </p:nvPicPr>
+              <p:blipFill>
+                <a:blip r:embed="rId10">
+                  <a:extLst>
+                    <a:ext uri="{28A0092B-C50C-407E-A947-70E740481C1C}">
+                      <a14:useLocalDpi xmlns:a14="http://schemas.microsoft.com/office/drawing/2010/main" val="0"/>
+                    </a:ext>
+                  </a:extLst>
+                </a:blip>
+                <a:srcRect/>
+                <a:stretch>
+                  <a:fillRect/>
+                </a:stretch>
+              </p:blipFill>
+              <p:spPr bwMode="auto">
+                <a:xfrm>
+                  <a:off x="2861991" y="2728402"/>
+                  <a:ext cx="3905844" cy="2929383"/>
+                </a:xfrm>
+                <a:prstGeom prst="rect">
+                  <a:avLst/>
+                </a:prstGeom>
+                <a:noFill/>
+                <a:extLst>
+                  <a:ext uri="{909E8E84-426E-40DD-AFC4-6F175D3DCCD1}">
+                    <a14:hiddenFill xmlns:a14="http://schemas.microsoft.com/office/drawing/2010/main">
+                      <a:solidFill>
+                        <a:srgbClr val="FFFFFF"/>
+                      </a:solidFill>
+                    </a14:hiddenFill>
+                  </a:ext>
+                </a:extLst>
+              </p:spPr>
+            </p:pic>
+          </p:grpSp>
+          <p:pic>
+            <p:nvPicPr>
+              <p:cNvPr id="1060" name="Picture 36" descr="Falhas do Microsoft Azure podem ter deixado hackers assumirem ...">
+                <a:extLst>
+                  <a:ext uri="{FF2B5EF4-FFF2-40B4-BE49-F238E27FC236}">
+                    <a16:creationId xmlns:a16="http://schemas.microsoft.com/office/drawing/2014/main" id="{CCF16353-32B2-4D5D-A9DF-FE99BE7BD12C}"/>
+                  </a:ext>
+                </a:extLst>
+              </p:cNvPr>
+              <p:cNvPicPr>
+                <a:picLocks noChangeAspect="1" noChangeArrowheads="1"/>
+              </p:cNvPicPr>
+              <p:nvPr/>
+            </p:nvPicPr>
+            <p:blipFill>
+              <a:blip r:embed="rId11">
+                <a:extLst>
+                  <a:ext uri="{28A0092B-C50C-407E-A947-70E740481C1C}">
+                    <a14:useLocalDpi xmlns:a14="http://schemas.microsoft.com/office/drawing/2010/main" val="0"/>
+                  </a:ext>
+                </a:extLst>
+              </a:blip>
+              <a:srcRect/>
+              <a:stretch>
+                <a:fillRect/>
+              </a:stretch>
+            </p:blipFill>
+            <p:spPr bwMode="auto">
+              <a:xfrm>
+                <a:off x="5794460" y="2428868"/>
+                <a:ext cx="2429464" cy="1214732"/>
+              </a:xfrm>
+              <a:prstGeom prst="rect">
+                <a:avLst/>
+              </a:prstGeom>
+              <a:noFill/>
+              <a:extLst>
+                <a:ext uri="{909E8E84-426E-40DD-AFC4-6F175D3DCCD1}">
+                  <a14:hiddenFill xmlns:a14="http://schemas.microsoft.com/office/drawing/2010/main">
+                    <a:solidFill>
+                      <a:srgbClr val="FFFFFF"/>
+                    </a:solidFill>
+                  </a14:hiddenFill>
+                </a:ext>
+              </a:extLst>
+            </p:spPr>
+          </p:pic>
+        </p:grpSp>
+        <p:sp>
+          <p:nvSpPr>
+            <p:cNvPr id="25" name="CaixaDeTexto 24">
+              <a:extLst>
+                <a:ext uri="{FF2B5EF4-FFF2-40B4-BE49-F238E27FC236}">
+                  <a16:creationId xmlns:a16="http://schemas.microsoft.com/office/drawing/2014/main" id="{216E8339-2E5B-4CB2-84FD-2715BDC8E4AD}"/>
+                </a:ext>
+              </a:extLst>
+            </p:cNvPr>
+            <p:cNvSpPr txBox="1"/>
+            <p:nvPr/>
+          </p:nvSpPr>
+          <p:spPr>
+            <a:xfrm>
+              <a:off x="4947044" y="2553419"/>
+              <a:ext cx="780598" cy="338554"/>
+            </a:xfrm>
+            <a:prstGeom prst="rect">
+              <a:avLst/>
+            </a:prstGeom>
+            <a:noFill/>
+          </p:spPr>
+          <p:txBody>
+            <a:bodyPr wrap="none" rtlCol="0">
+              <a:spAutoFit/>
+            </a:bodyPr>
+            <a:lstStyle/>
+            <a:p>
+              <a:r>
+                <a:rPr lang="pt-BR" sz="1600" b="1" dirty="0"/>
+                <a:t>CLOUD</a:t>
+              </a:r>
+              <a:endParaRPr lang="pt-BR" b="1" dirty="0"/>
+            </a:p>
+          </p:txBody>
+        </p:sp>
+      </p:grpSp>
+      <p:cxnSp>
+        <p:nvCxnSpPr>
+          <p:cNvPr id="33" name="Conector: Curvo 32">
+            <a:extLst>
+              <a:ext uri="{FF2B5EF4-FFF2-40B4-BE49-F238E27FC236}">
+                <a16:creationId xmlns:a16="http://schemas.microsoft.com/office/drawing/2014/main" id="{FF7B03E1-52C8-4D0C-8673-6F1F78378F98}"/>
+              </a:ext>
+            </a:extLst>
+          </p:cNvPr>
+          <p:cNvCxnSpPr/>
+          <p:nvPr/>
+        </p:nvCxnSpPr>
+        <p:spPr>
+          <a:xfrm rot="16200000" flipH="1">
+            <a:off x="1602494" y="2438919"/>
+            <a:ext cx="782678" cy="472291"/>
+          </a:xfrm>
+          <a:prstGeom prst="curvedConnector3">
+            <a:avLst>
+              <a:gd name="adj1" fmla="val 27492"/>
+            </a:avLst>
+          </a:prstGeom>
+          <a:ln>
+            <a:solidFill>
+              <a:schemeClr val="tx1"/>
+            </a:solidFill>
+            <a:tailEnd type="triangle"/>
+          </a:ln>
+        </p:spPr>
+        <p:style>
+          <a:lnRef idx="1">
+            <a:schemeClr val="accent1"/>
+          </a:lnRef>
+          <a:fillRef idx="0">
+            <a:schemeClr val="accent1"/>
+          </a:fillRef>
+          <a:effectRef idx="0">
+            <a:schemeClr val="accent1"/>
+          </a:effectRef>
+          <a:fontRef idx="minor">
+            <a:schemeClr val="tx1"/>
+          </a:fontRef>
+        </p:style>
+      </p:cxnSp>
+      <p:grpSp>
+        <p:nvGrpSpPr>
+          <p:cNvPr id="36" name="Agrupar 35">
+            <a:extLst>
+              <a:ext uri="{FF2B5EF4-FFF2-40B4-BE49-F238E27FC236}">
+                <a16:creationId xmlns:a16="http://schemas.microsoft.com/office/drawing/2014/main" id="{AC68DA63-CEB7-4289-B95E-AF680FB578B8}"/>
+              </a:ext>
+            </a:extLst>
+          </p:cNvPr>
+          <p:cNvGrpSpPr/>
+          <p:nvPr/>
+        </p:nvGrpSpPr>
+        <p:grpSpPr>
+          <a:xfrm>
+            <a:off x="7406820" y="1185811"/>
+            <a:ext cx="4276000" cy="3137354"/>
+            <a:chOff x="7029974" y="839625"/>
+            <a:chExt cx="4276000" cy="3137354"/>
+          </a:xfrm>
+        </p:grpSpPr>
+        <p:sp>
+          <p:nvSpPr>
+            <p:cNvPr id="27" name="Retângulo 26">
+              <a:extLst>
+                <a:ext uri="{FF2B5EF4-FFF2-40B4-BE49-F238E27FC236}">
+                  <a16:creationId xmlns:a16="http://schemas.microsoft.com/office/drawing/2014/main" id="{0D3D6589-37D4-40C1-8054-56A29383C788}"/>
+                </a:ext>
+              </a:extLst>
+            </p:cNvPr>
+            <p:cNvSpPr/>
+            <p:nvPr/>
+          </p:nvSpPr>
+          <p:spPr>
+            <a:xfrm>
+              <a:off x="7029974" y="1117420"/>
+              <a:ext cx="4177718" cy="2859559"/>
+            </a:xfrm>
+            <a:prstGeom prst="rect">
+              <a:avLst/>
+            </a:prstGeom>
+            <a:noFill/>
+            <a:ln>
+              <a:solidFill>
+                <a:schemeClr val="tx1"/>
+              </a:solidFill>
+            </a:ln>
+          </p:spPr>
+          <p:style>
+            <a:lnRef idx="2">
+              <a:schemeClr val="accent1">
+                <a:shade val="50000"/>
+              </a:schemeClr>
+            </a:lnRef>
+            <a:fillRef idx="1">
+              <a:schemeClr val="accent1"/>
+            </a:fillRef>
+            <a:effectRef idx="0">
+              <a:schemeClr val="accent1"/>
+            </a:effectRef>
+            <a:fontRef idx="minor">
+              <a:schemeClr val="lt1"/>
+            </a:fontRef>
+          </p:style>
+          <p:txBody>
+            <a:bodyPr rtlCol="0" anchor="ctr"/>
+            <a:lstStyle/>
+            <a:p>
+              <a:pPr algn="ctr"/>
+              <a:endParaRPr lang="pt-BR" dirty="0"/>
+            </a:p>
+          </p:txBody>
+        </p:sp>
+        <p:pic>
+          <p:nvPicPr>
+            <p:cNvPr id="45" name="Picture 12" descr="Notebook Svg Png Icon Free Download (#533755) - OnlineWebFonts.COM">
+              <a:extLst>
+                <a:ext uri="{FF2B5EF4-FFF2-40B4-BE49-F238E27FC236}">
+                  <a16:creationId xmlns:a16="http://schemas.microsoft.com/office/drawing/2014/main" id="{A9CD7134-B296-404D-800E-57F167B21760}"/>
+                </a:ext>
+              </a:extLst>
+            </p:cNvPr>
+            <p:cNvPicPr>
+              <a:picLocks noChangeAspect="1" noChangeArrowheads="1"/>
+            </p:cNvPicPr>
+            <p:nvPr/>
+          </p:nvPicPr>
+          <p:blipFill>
+            <a:blip r:embed="rId5">
+              <a:extLst>
+                <a:ext uri="{28A0092B-C50C-407E-A947-70E740481C1C}">
+                  <a14:useLocalDpi xmlns:a14="http://schemas.microsoft.com/office/drawing/2010/main" val="0"/>
+                </a:ext>
+              </a:extLst>
+            </a:blip>
+            <a:srcRect/>
+            <a:stretch>
+              <a:fillRect/>
+            </a:stretch>
+          </p:blipFill>
+          <p:spPr bwMode="auto">
+            <a:xfrm>
+              <a:off x="7041681" y="1619840"/>
+              <a:ext cx="2357081" cy="1604822"/>
+            </a:xfrm>
+            <a:prstGeom prst="rect">
+              <a:avLst/>
+            </a:prstGeom>
+            <a:noFill/>
+            <a:extLst>
+              <a:ext uri="{909E8E84-426E-40DD-AFC4-6F175D3DCCD1}">
+                <a14:hiddenFill xmlns:a14="http://schemas.microsoft.com/office/drawing/2010/main">
+                  <a:solidFill>
+                    <a:srgbClr val="FFFFFF"/>
+                  </a:solidFill>
+                </a14:hiddenFill>
+              </a:ext>
+            </a:extLst>
+          </p:spPr>
+        </p:pic>
+        <p:pic>
+          <p:nvPicPr>
+            <p:cNvPr id="46" name="Imagem 45">
+              <a:extLst>
+                <a:ext uri="{FF2B5EF4-FFF2-40B4-BE49-F238E27FC236}">
+                  <a16:creationId xmlns:a16="http://schemas.microsoft.com/office/drawing/2014/main" id="{4C51068D-47B3-4361-A2C8-D13611653EE8}"/>
+                </a:ext>
+              </a:extLst>
+            </p:cNvPr>
+            <p:cNvPicPr>
+              <a:picLocks noChangeAspect="1"/>
+            </p:cNvPicPr>
+            <p:nvPr/>
+          </p:nvPicPr>
+          <p:blipFill>
+            <a:blip r:embed="rId12">
+              <a:extLst>
+                <a:ext uri="{28A0092B-C50C-407E-A947-70E740481C1C}">
+                  <a14:useLocalDpi xmlns:a14="http://schemas.microsoft.com/office/drawing/2010/main" val="0"/>
+                </a:ext>
+              </a:extLst>
+            </a:blip>
+            <a:stretch>
+              <a:fillRect/>
+            </a:stretch>
+          </p:blipFill>
+          <p:spPr>
+            <a:xfrm>
+              <a:off x="9650962" y="1793308"/>
+              <a:ext cx="1164686" cy="1229988"/>
+            </a:xfrm>
+            <a:prstGeom prst="rect">
+              <a:avLst/>
+            </a:prstGeom>
+          </p:spPr>
+        </p:pic>
+        <p:pic>
+          <p:nvPicPr>
+            <p:cNvPr id="1062" name="Picture 38" descr="SB Admin - Free Bootstrap Admin Template - Start Bootstrap">
+              <a:extLst>
+                <a:ext uri="{FF2B5EF4-FFF2-40B4-BE49-F238E27FC236}">
+                  <a16:creationId xmlns:a16="http://schemas.microsoft.com/office/drawing/2014/main" id="{8C2A37CF-1187-4369-B2F1-2A24C13CB70B}"/>
+                </a:ext>
+              </a:extLst>
+            </p:cNvPr>
+            <p:cNvPicPr>
+              <a:picLocks noChangeAspect="1" noChangeArrowheads="1"/>
+            </p:cNvPicPr>
+            <p:nvPr/>
+          </p:nvPicPr>
+          <p:blipFill>
+            <a:blip r:embed="rId13">
+              <a:extLst>
+                <a:ext uri="{28A0092B-C50C-407E-A947-70E740481C1C}">
+                  <a14:useLocalDpi xmlns:a14="http://schemas.microsoft.com/office/drawing/2010/main" val="0"/>
+                </a:ext>
+              </a:extLst>
+            </a:blip>
+            <a:srcRect/>
+            <a:stretch>
+              <a:fillRect/>
+            </a:stretch>
+          </p:blipFill>
+          <p:spPr bwMode="auto">
+            <a:xfrm>
+              <a:off x="7399798" y="1705186"/>
+              <a:ext cx="1621571" cy="777955"/>
+            </a:xfrm>
+            <a:prstGeom prst="rect">
+              <a:avLst/>
+            </a:prstGeom>
+            <a:noFill/>
+            <a:extLst>
+              <a:ext uri="{909E8E84-426E-40DD-AFC4-6F175D3DCCD1}">
+                <a14:hiddenFill xmlns:a14="http://schemas.microsoft.com/office/drawing/2010/main">
+                  <a:solidFill>
+                    <a:srgbClr val="FFFFFF"/>
+                  </a:solidFill>
+                </a14:hiddenFill>
+              </a:ext>
+            </a:extLst>
+          </p:spPr>
+        </p:pic>
+        <p:pic>
+          <p:nvPicPr>
+            <p:cNvPr id="55" name="Picture 38" descr="SB Admin - Free Bootstrap Admin Template - Start Bootstrap">
+              <a:extLst>
+                <a:ext uri="{FF2B5EF4-FFF2-40B4-BE49-F238E27FC236}">
+                  <a16:creationId xmlns:a16="http://schemas.microsoft.com/office/drawing/2014/main" id="{34A32308-0491-435D-8019-847A13E21DF0}"/>
+                </a:ext>
+              </a:extLst>
+            </p:cNvPr>
+            <p:cNvPicPr>
+              <a:picLocks noChangeAspect="1" noChangeArrowheads="1"/>
+            </p:cNvPicPr>
+            <p:nvPr/>
+          </p:nvPicPr>
+          <p:blipFill>
+            <a:blip r:embed="rId13">
+              <a:extLst>
+                <a:ext uri="{28A0092B-C50C-407E-A947-70E740481C1C}">
+                  <a14:useLocalDpi xmlns:a14="http://schemas.microsoft.com/office/drawing/2010/main" val="0"/>
+                </a:ext>
+              </a:extLst>
+            </a:blip>
+            <a:srcRect/>
+            <a:stretch>
+              <a:fillRect/>
+            </a:stretch>
+          </p:blipFill>
+          <p:spPr bwMode="auto">
+            <a:xfrm rot="20534959">
+              <a:off x="10077843" y="1911395"/>
+              <a:ext cx="401496" cy="835602"/>
+            </a:xfrm>
+            <a:prstGeom prst="rect">
+              <a:avLst/>
+            </a:prstGeom>
+            <a:noFill/>
+            <a:extLst>
+              <a:ext uri="{909E8E84-426E-40DD-AFC4-6F175D3DCCD1}">
+                <a14:hiddenFill xmlns:a14="http://schemas.microsoft.com/office/drawing/2010/main">
+                  <a:solidFill>
+                    <a:srgbClr val="FFFFFF"/>
+                  </a:solidFill>
+                </a14:hiddenFill>
+              </a:ext>
+            </a:extLst>
+          </p:spPr>
+        </p:pic>
+        <p:sp>
+          <p:nvSpPr>
+            <p:cNvPr id="35" name="CaixaDeTexto 34">
+              <a:extLst>
+                <a:ext uri="{FF2B5EF4-FFF2-40B4-BE49-F238E27FC236}">
+                  <a16:creationId xmlns:a16="http://schemas.microsoft.com/office/drawing/2014/main" id="{18781F4C-E95A-4345-B0C2-4B42D5FE3CCE}"/>
+                </a:ext>
+              </a:extLst>
+            </p:cNvPr>
+            <p:cNvSpPr txBox="1"/>
+            <p:nvPr/>
+          </p:nvSpPr>
+          <p:spPr>
+            <a:xfrm>
+              <a:off x="10325321" y="839625"/>
+              <a:ext cx="980653" cy="338554"/>
+            </a:xfrm>
+            <a:prstGeom prst="rect">
+              <a:avLst/>
+            </a:prstGeom>
+            <a:noFill/>
+          </p:spPr>
+          <p:txBody>
+            <a:bodyPr wrap="none" rtlCol="0">
+              <a:spAutoFit/>
+            </a:bodyPr>
+            <a:lstStyle/>
+            <a:p>
+              <a:r>
+                <a:rPr lang="pt-BR" sz="1600" b="1" dirty="0"/>
+                <a:t>USÚARIO</a:t>
+              </a:r>
+            </a:p>
+          </p:txBody>
+        </p:sp>
+      </p:grpSp>
+      <p:cxnSp>
+        <p:nvCxnSpPr>
+          <p:cNvPr id="38" name="Conector: Curvo 37">
+            <a:extLst>
+              <a:ext uri="{FF2B5EF4-FFF2-40B4-BE49-F238E27FC236}">
+                <a16:creationId xmlns:a16="http://schemas.microsoft.com/office/drawing/2014/main" id="{609F40C6-43BF-425B-ACA0-3C24860BB445}"/>
+              </a:ext>
+            </a:extLst>
+          </p:cNvPr>
+          <p:cNvCxnSpPr>
+            <a:cxnSpLocks/>
+          </p:cNvCxnSpPr>
+          <p:nvPr/>
+        </p:nvCxnSpPr>
+        <p:spPr>
+          <a:xfrm flipV="1">
+            <a:off x="5770362" y="2553716"/>
+            <a:ext cx="1474056" cy="1025375"/>
+          </a:xfrm>
+          <a:prstGeom prst="curvedConnector3">
+            <a:avLst>
+              <a:gd name="adj1" fmla="val 57968"/>
+            </a:avLst>
+          </a:prstGeom>
+          <a:ln>
+            <a:solidFill>
+              <a:schemeClr val="tx1"/>
+            </a:solidFill>
+            <a:tailEnd type="triangle"/>
+          </a:ln>
+        </p:spPr>
+        <p:style>
+          <a:lnRef idx="1">
+            <a:schemeClr val="accent1"/>
+          </a:lnRef>
+          <a:fillRef idx="0">
+            <a:schemeClr val="accent1"/>
+          </a:fillRef>
+          <a:effectRef idx="0">
+            <a:schemeClr val="accent1"/>
+          </a:effectRef>
+          <a:fontRef idx="minor">
+            <a:schemeClr val="tx1"/>
+          </a:fontRef>
+        </p:style>
+      </p:cxnSp>
+    </p:spTree>
+    <p:extLst>
+      <p:ext uri="{BB962C8B-B14F-4D97-AF65-F5344CB8AC3E}">
+        <p14:creationId xmlns:p14="http://schemas.microsoft.com/office/powerpoint/2010/main" val="4048395158"/>
+      </p:ext>
+    </p:extLst>
+  </p:cSld>
+  <p:clrMapOvr>
+    <a:masterClrMapping/>
+  </p:clrMapOvr>
+</p:sld>
+</file>
+
 <file path=ppt/theme/theme1.xml><?xml version="1.0" encoding="utf-8"?>
 <a:theme xmlns:a="http://schemas.openxmlformats.org/drawingml/2006/main" name="Tema do Office">
   <a:themeElements>

</xml_diff>